<commit_message>
Polish on the UWP slides.
</commit_message>
<xml_diff>
--- a/Presentations/Building Modern Mobile Apps - UWP.pptx
+++ b/Presentations/Building Modern Mobile Apps - UWP.pptx
@@ -6,10 +6,10 @@
     <p:sldMasterId id="2147483682" r:id="rId2"/>
   </p:sldMasterIdLst>
   <p:notesMasterIdLst>
-    <p:notesMasterId r:id="rId70"/>
+    <p:notesMasterId r:id="rId71"/>
   </p:notesMasterIdLst>
   <p:handoutMasterIdLst>
-    <p:handoutMasterId r:id="rId71"/>
+    <p:handoutMasterId r:id="rId72"/>
   </p:handoutMasterIdLst>
   <p:sldIdLst>
     <p:sldId id="258" r:id="rId3"/>
@@ -75,10 +75,11 @@
     <p:sldId id="332" r:id="rId63"/>
     <p:sldId id="333" r:id="rId64"/>
     <p:sldId id="334" r:id="rId65"/>
-    <p:sldId id="336" r:id="rId66"/>
-    <p:sldId id="339" r:id="rId67"/>
-    <p:sldId id="337" r:id="rId68"/>
-    <p:sldId id="325" r:id="rId69"/>
+    <p:sldId id="340" r:id="rId66"/>
+    <p:sldId id="336" r:id="rId67"/>
+    <p:sldId id="339" r:id="rId68"/>
+    <p:sldId id="337" r:id="rId69"/>
+    <p:sldId id="325" r:id="rId70"/>
   </p:sldIdLst>
   <p:sldSz cx="9144000" cy="5143500" type="screen16x9"/>
   <p:notesSz cx="6858000" cy="9144000"/>
@@ -1851,6 +1852,13 @@
         </dgm:presLayoutVars>
       </dgm:prSet>
       <dgm:spPr/>
+      <dgm:t>
+        <a:bodyPr/>
+        <a:lstStyle/>
+        <a:p>
+          <a:endParaRPr lang="en-US"/>
+        </a:p>
+      </dgm:t>
     </dgm:pt>
     <dgm:pt modelId="{691D2669-850B-4433-961B-07060798FEE0}" type="pres">
       <dgm:prSet presAssocID="{51AE4B92-CBCB-4327-9680-A2B2EEEED494}" presName="boxAndChildren" presStyleCnt="0"/>
@@ -1859,10 +1867,24 @@
     <dgm:pt modelId="{FC25C185-E188-40C4-A921-D78E264F215A}" type="pres">
       <dgm:prSet presAssocID="{51AE4B92-CBCB-4327-9680-A2B2EEEED494}" presName="parentTextBox" presStyleLbl="node1" presStyleIdx="0" presStyleCnt="1"/>
       <dgm:spPr/>
+      <dgm:t>
+        <a:bodyPr/>
+        <a:lstStyle/>
+        <a:p>
+          <a:endParaRPr lang="en-US"/>
+        </a:p>
+      </dgm:t>
     </dgm:pt>
     <dgm:pt modelId="{1D864A7B-0778-4BDA-A04B-ABD03BB125E4}" type="pres">
       <dgm:prSet presAssocID="{51AE4B92-CBCB-4327-9680-A2B2EEEED494}" presName="entireBox" presStyleLbl="node1" presStyleIdx="0" presStyleCnt="1"/>
       <dgm:spPr/>
+      <dgm:t>
+        <a:bodyPr/>
+        <a:lstStyle/>
+        <a:p>
+          <a:endParaRPr lang="en-US"/>
+        </a:p>
+      </dgm:t>
     </dgm:pt>
     <dgm:pt modelId="{1BE1E3A7-E596-4709-B93B-7DB81ACA3CB5}" type="pres">
       <dgm:prSet presAssocID="{51AE4B92-CBCB-4327-9680-A2B2EEEED494}" presName="descendantBox" presStyleCnt="0"/>
@@ -1875,6 +1897,13 @@
         </dgm:presLayoutVars>
       </dgm:prSet>
       <dgm:spPr/>
+      <dgm:t>
+        <a:bodyPr/>
+        <a:lstStyle/>
+        <a:p>
+          <a:endParaRPr lang="en-US"/>
+        </a:p>
+      </dgm:t>
     </dgm:pt>
   </dgm:ptLst>
   <dgm:cxnLst>
@@ -1883,8 +1912,8 @@
     <dgm:cxn modelId="{8FE51E49-537F-4944-9CE9-CBDB66DB0F13}" srcId="{454212D9-1AC4-40B1-81DF-DE7788006E85}" destId="{09CCB068-F52D-4865-A500-9FCDA2678233}" srcOrd="0" destOrd="0" parTransId="{58ADB105-7685-4251-B670-41CF76C295AF}" sibTransId="{3BC80419-1DFD-4177-951F-6C93A43E5D73}"/>
     <dgm:cxn modelId="{7FB2C02E-A17D-4328-A4F0-E54907076CC5}" srcId="{51AE4B92-CBCB-4327-9680-A2B2EEEED494}" destId="{454212D9-1AC4-40B1-81DF-DE7788006E85}" srcOrd="0" destOrd="0" parTransId="{7A908EDA-DC76-416A-9178-0EB406C60593}" sibTransId="{D65E2914-D915-4121-9899-82D44DD5C46F}"/>
     <dgm:cxn modelId="{E0998477-7E5A-4AB3-9308-F07111C1B3B0}" type="presOf" srcId="{51AE4B92-CBCB-4327-9680-A2B2EEEED494}" destId="{1D864A7B-0778-4BDA-A04B-ABD03BB125E4}" srcOrd="1" destOrd="0" presId="urn:microsoft.com/office/officeart/2005/8/layout/process4"/>
+    <dgm:cxn modelId="{B44EF038-1FB1-4394-A1C2-26AE3DA8B057}" type="presOf" srcId="{8F3B4AAF-0FB8-4852-A133-E985DD9884B9}" destId="{5CA56B54-A9B2-4B1D-9FDB-9B8D867F2BE0}" srcOrd="0" destOrd="0" presId="urn:microsoft.com/office/officeart/2005/8/layout/process4"/>
     <dgm:cxn modelId="{D08B8F9A-F0B9-4FED-AFA9-01E4CF50B204}" type="presOf" srcId="{09CCB068-F52D-4865-A500-9FCDA2678233}" destId="{B0A94A57-1A8E-411D-ABCD-C4C028370D6D}" srcOrd="0" destOrd="1" presId="urn:microsoft.com/office/officeart/2005/8/layout/process4"/>
-    <dgm:cxn modelId="{B44EF038-1FB1-4394-A1C2-26AE3DA8B057}" type="presOf" srcId="{8F3B4AAF-0FB8-4852-A133-E985DD9884B9}" destId="{5CA56B54-A9B2-4B1D-9FDB-9B8D867F2BE0}" srcOrd="0" destOrd="0" presId="urn:microsoft.com/office/officeart/2005/8/layout/process4"/>
     <dgm:cxn modelId="{B18D230B-E57F-4A7C-BA55-5626DF198CF9}" type="presOf" srcId="{454212D9-1AC4-40B1-81DF-DE7788006E85}" destId="{B0A94A57-1A8E-411D-ABCD-C4C028370D6D}" srcOrd="0" destOrd="0" presId="urn:microsoft.com/office/officeart/2005/8/layout/process4"/>
     <dgm:cxn modelId="{4ED3DBD8-6D7D-4910-BF96-1C7134405919}" type="presParOf" srcId="{5CA56B54-A9B2-4B1D-9FDB-9B8D867F2BE0}" destId="{691D2669-850B-4433-961B-07060798FEE0}" srcOrd="0" destOrd="0" presId="urn:microsoft.com/office/officeart/2005/8/layout/process4"/>
     <dgm:cxn modelId="{A9A09533-9B86-46F5-BB28-029EF268E14F}" type="presParOf" srcId="{691D2669-850B-4433-961B-07060798FEE0}" destId="{FC25C185-E188-40C4-A921-D78E264F215A}" srcOrd="0" destOrd="0" presId="urn:microsoft.com/office/officeart/2005/8/layout/process4"/>
@@ -1925,10 +1954,10 @@
         <a:p>
           <a:pPr rtl="0"/>
           <a:r>
-            <a:rPr lang="en-US" smtClean="0"/>
+            <a:rPr lang="en-US" dirty="0" smtClean="0"/>
             <a:t>Deployment</a:t>
           </a:r>
-          <a:endParaRPr lang="en-US"/>
+          <a:endParaRPr lang="en-US" dirty="0"/>
         </a:p>
       </dgm:t>
     </dgm:pt>
@@ -2190,6 +2219,13 @@
         </dgm:presLayoutVars>
       </dgm:prSet>
       <dgm:spPr/>
+      <dgm:t>
+        <a:bodyPr/>
+        <a:lstStyle/>
+        <a:p>
+          <a:endParaRPr lang="en-US"/>
+        </a:p>
+      </dgm:t>
     </dgm:pt>
     <dgm:pt modelId="{1892DFC7-10D1-4A21-A710-3BA8536849E8}" type="pres">
       <dgm:prSet presAssocID="{41AA1F89-4097-4C98-8749-DB7B7B647B18}" presName="cycle" presStyleCnt="0"/>
@@ -2202,10 +2238,24 @@
         </dgm:presLayoutVars>
       </dgm:prSet>
       <dgm:spPr/>
+      <dgm:t>
+        <a:bodyPr/>
+        <a:lstStyle/>
+        <a:p>
+          <a:endParaRPr lang="en-US"/>
+        </a:p>
+      </dgm:t>
     </dgm:pt>
     <dgm:pt modelId="{FE930957-A3A7-48EC-A289-6333D049AB6E}" type="pres">
       <dgm:prSet presAssocID="{9E392A3D-B188-4BC5-8895-BE151463B5FB}" presName="sibTransFirstNode" presStyleLbl="bgShp" presStyleIdx="0" presStyleCnt="1"/>
       <dgm:spPr/>
+      <dgm:t>
+        <a:bodyPr/>
+        <a:lstStyle/>
+        <a:p>
+          <a:endParaRPr lang="en-US"/>
+        </a:p>
+      </dgm:t>
     </dgm:pt>
     <dgm:pt modelId="{19C0A9BD-468E-4C44-81B9-CEB130F72C20}" type="pres">
       <dgm:prSet presAssocID="{E9EC61E7-935D-47AE-9394-5775C4F4216F}" presName="nodeFollowingNodes" presStyleLbl="node1" presStyleIdx="1" presStyleCnt="7">
@@ -2214,6 +2264,13 @@
         </dgm:presLayoutVars>
       </dgm:prSet>
       <dgm:spPr/>
+      <dgm:t>
+        <a:bodyPr/>
+        <a:lstStyle/>
+        <a:p>
+          <a:endParaRPr lang="en-US"/>
+        </a:p>
+      </dgm:t>
     </dgm:pt>
     <dgm:pt modelId="{861C154B-4F25-4EA7-92FB-DEF17F2F59A9}" type="pres">
       <dgm:prSet presAssocID="{75108196-0762-4FBC-8585-D5D335248264}" presName="nodeFollowingNodes" presStyleLbl="node1" presStyleIdx="2" presStyleCnt="7">
@@ -2222,6 +2279,13 @@
         </dgm:presLayoutVars>
       </dgm:prSet>
       <dgm:spPr/>
+      <dgm:t>
+        <a:bodyPr/>
+        <a:lstStyle/>
+        <a:p>
+          <a:endParaRPr lang="en-US"/>
+        </a:p>
+      </dgm:t>
     </dgm:pt>
     <dgm:pt modelId="{4E5ACDAF-2FE1-4685-852D-3D6548605A78}" type="pres">
       <dgm:prSet presAssocID="{4E7474D5-B8FA-4F9A-A228-36D51C64D0C6}" presName="nodeFollowingNodes" presStyleLbl="node1" presStyleIdx="3" presStyleCnt="7">
@@ -2230,6 +2294,13 @@
         </dgm:presLayoutVars>
       </dgm:prSet>
       <dgm:spPr/>
+      <dgm:t>
+        <a:bodyPr/>
+        <a:lstStyle/>
+        <a:p>
+          <a:endParaRPr lang="en-US"/>
+        </a:p>
+      </dgm:t>
     </dgm:pt>
     <dgm:pt modelId="{EFD15585-B419-4FBB-A5D7-6FE6C6271E64}" type="pres">
       <dgm:prSet presAssocID="{ED66EC82-850B-4C72-88BC-259393A131BA}" presName="nodeFollowingNodes" presStyleLbl="node1" presStyleIdx="4" presStyleCnt="7">
@@ -2238,6 +2309,13 @@
         </dgm:presLayoutVars>
       </dgm:prSet>
       <dgm:spPr/>
+      <dgm:t>
+        <a:bodyPr/>
+        <a:lstStyle/>
+        <a:p>
+          <a:endParaRPr lang="en-US"/>
+        </a:p>
+      </dgm:t>
     </dgm:pt>
     <dgm:pt modelId="{FBC7ED90-F4B4-4D7C-97EB-0B8332DC727D}" type="pres">
       <dgm:prSet presAssocID="{075E7AE5-E457-46D8-BF6E-65BD17F20D8A}" presName="nodeFollowingNodes" presStyleLbl="node1" presStyleIdx="5" presStyleCnt="7">
@@ -2246,6 +2324,13 @@
         </dgm:presLayoutVars>
       </dgm:prSet>
       <dgm:spPr/>
+      <dgm:t>
+        <a:bodyPr/>
+        <a:lstStyle/>
+        <a:p>
+          <a:endParaRPr lang="en-US"/>
+        </a:p>
+      </dgm:t>
     </dgm:pt>
     <dgm:pt modelId="{02A31C5A-AFD8-4444-BA7C-EC257E923F37}" type="pres">
       <dgm:prSet presAssocID="{5ADA003F-54FF-47E1-ACCC-BBC718499DF5}" presName="nodeFollowingNodes" presStyleLbl="node1" presStyleIdx="6" presStyleCnt="7">
@@ -2254,25 +2339,32 @@
         </dgm:presLayoutVars>
       </dgm:prSet>
       <dgm:spPr/>
+      <dgm:t>
+        <a:bodyPr/>
+        <a:lstStyle/>
+        <a:p>
+          <a:endParaRPr lang="en-US"/>
+        </a:p>
+      </dgm:t>
     </dgm:pt>
   </dgm:ptLst>
   <dgm:cxnLst>
+    <dgm:cxn modelId="{0CAAE964-C3D8-4BFD-92DC-7B7F3CFEE1DE}" srcId="{41AA1F89-4097-4C98-8749-DB7B7B647B18}" destId="{5ADA003F-54FF-47E1-ACCC-BBC718499DF5}" srcOrd="6" destOrd="0" parTransId="{87E91A11-1A4D-4B89-9815-F8EA08C1FC15}" sibTransId="{E5C7117D-7B8A-4510-921F-164088421800}"/>
+    <dgm:cxn modelId="{128605B4-F9A3-4D1D-B5C9-4F6D6F45D89B}" srcId="{41AA1F89-4097-4C98-8749-DB7B7B647B18}" destId="{4E7474D5-B8FA-4F9A-A228-36D51C64D0C6}" srcOrd="3" destOrd="0" parTransId="{53EE38A2-6341-40FF-AE94-93738AF0C770}" sibTransId="{EF00F98A-6CC1-4143-9C2A-E585711BC5E9}"/>
+    <dgm:cxn modelId="{9C40D98B-6C49-4104-939B-6A953176A767}" type="presOf" srcId="{075E7AE5-E457-46D8-BF6E-65BD17F20D8A}" destId="{FBC7ED90-F4B4-4D7C-97EB-0B8332DC727D}" srcOrd="0" destOrd="0" presId="urn:microsoft.com/office/officeart/2005/8/layout/cycle3"/>
+    <dgm:cxn modelId="{44ACDED9-90E5-484A-A436-7262A7044546}" srcId="{41AA1F89-4097-4C98-8749-DB7B7B647B18}" destId="{ED66EC82-850B-4C72-88BC-259393A131BA}" srcOrd="4" destOrd="0" parTransId="{DFF3C354-CCBA-4B14-8D89-52B645BE42AD}" sibTransId="{61B059A8-926A-4C6D-8411-DA1F6A391BBE}"/>
+    <dgm:cxn modelId="{723F3D62-3B31-4F33-96F3-B06C4B082B63}" type="presOf" srcId="{9E392A3D-B188-4BC5-8895-BE151463B5FB}" destId="{FE930957-A3A7-48EC-A289-6333D049AB6E}" srcOrd="0" destOrd="0" presId="urn:microsoft.com/office/officeart/2005/8/layout/cycle3"/>
+    <dgm:cxn modelId="{179201D4-657D-462C-B7C2-52D1A2711844}" type="presOf" srcId="{5ADA003F-54FF-47E1-ACCC-BBC718499DF5}" destId="{02A31C5A-AFD8-4444-BA7C-EC257E923F37}" srcOrd="0" destOrd="0" presId="urn:microsoft.com/office/officeart/2005/8/layout/cycle3"/>
+    <dgm:cxn modelId="{5F2B4F43-CFBB-4D72-A7FB-B5F0393F8F09}" type="presOf" srcId="{E9EC61E7-935D-47AE-9394-5775C4F4216F}" destId="{19C0A9BD-468E-4C44-81B9-CEB130F72C20}" srcOrd="0" destOrd="0" presId="urn:microsoft.com/office/officeart/2005/8/layout/cycle3"/>
+    <dgm:cxn modelId="{1B3887BC-7AA9-4BFD-AC31-D9B7D62327A8}" type="presOf" srcId="{4E7474D5-B8FA-4F9A-A228-36D51C64D0C6}" destId="{4E5ACDAF-2FE1-4685-852D-3D6548605A78}" srcOrd="0" destOrd="0" presId="urn:microsoft.com/office/officeart/2005/8/layout/cycle3"/>
     <dgm:cxn modelId="{AAAFCCE0-6E5C-4458-B970-FB5669C83041}" srcId="{41AA1F89-4097-4C98-8749-DB7B7B647B18}" destId="{E9EC61E7-935D-47AE-9394-5775C4F4216F}" srcOrd="1" destOrd="0" parTransId="{4B718956-2E35-4FDC-ACB9-D7B736F952A4}" sibTransId="{439C7CD4-FC86-4DD9-B521-421EA40F3187}"/>
-    <dgm:cxn modelId="{1B3887BC-7AA9-4BFD-AC31-D9B7D62327A8}" type="presOf" srcId="{4E7474D5-B8FA-4F9A-A228-36D51C64D0C6}" destId="{4E5ACDAF-2FE1-4685-852D-3D6548605A78}" srcOrd="0" destOrd="0" presId="urn:microsoft.com/office/officeart/2005/8/layout/cycle3"/>
+    <dgm:cxn modelId="{BFF2757E-8C42-4FE7-BF38-F7F7D53E7449}" type="presOf" srcId="{56C055A0-D9F0-4FB9-A237-F2123BB25044}" destId="{94581017-CD0B-49FE-B542-830E5008D1B8}" srcOrd="0" destOrd="0" presId="urn:microsoft.com/office/officeart/2005/8/layout/cycle3"/>
+    <dgm:cxn modelId="{82850418-4F44-4ABF-BCE1-18BAE3596B98}" type="presOf" srcId="{75108196-0762-4FBC-8585-D5D335248264}" destId="{861C154B-4F25-4EA7-92FB-DEF17F2F59A9}" srcOrd="0" destOrd="0" presId="urn:microsoft.com/office/officeart/2005/8/layout/cycle3"/>
+    <dgm:cxn modelId="{BE306E19-DC6B-4251-A200-F0061B892E96}" type="presOf" srcId="{41AA1F89-4097-4C98-8749-DB7B7B647B18}" destId="{3585F9A1-360C-49D1-ACFE-7227C7FDC0F8}" srcOrd="0" destOrd="0" presId="urn:microsoft.com/office/officeart/2005/8/layout/cycle3"/>
+    <dgm:cxn modelId="{B73A5158-FEBA-4DD6-A9F6-4A2CDAF9337C}" srcId="{41AA1F89-4097-4C98-8749-DB7B7B647B18}" destId="{75108196-0762-4FBC-8585-D5D335248264}" srcOrd="2" destOrd="0" parTransId="{AABC88FC-B5A9-4003-B841-F28A0586BC44}" sibTransId="{916D7D6B-5DDC-40D5-A283-388C66BF1ED0}"/>
+    <dgm:cxn modelId="{3FE4076D-A4D5-435B-896E-1B5F847D261F}" type="presOf" srcId="{ED66EC82-850B-4C72-88BC-259393A131BA}" destId="{EFD15585-B419-4FBB-A5D7-6FE6C6271E64}" srcOrd="0" destOrd="0" presId="urn:microsoft.com/office/officeart/2005/8/layout/cycle3"/>
     <dgm:cxn modelId="{1919DB94-B4A5-4ECB-ACDD-C08565935137}" srcId="{41AA1F89-4097-4C98-8749-DB7B7B647B18}" destId="{075E7AE5-E457-46D8-BF6E-65BD17F20D8A}" srcOrd="5" destOrd="0" parTransId="{A741170B-E12E-4451-86CD-9486DA6EF8B6}" sibTransId="{7D65E7C7-3D92-46BF-90B9-73DD9B4C9C06}"/>
-    <dgm:cxn modelId="{44ACDED9-90E5-484A-A436-7262A7044546}" srcId="{41AA1F89-4097-4C98-8749-DB7B7B647B18}" destId="{ED66EC82-850B-4C72-88BC-259393A131BA}" srcOrd="4" destOrd="0" parTransId="{DFF3C354-CCBA-4B14-8D89-52B645BE42AD}" sibTransId="{61B059A8-926A-4C6D-8411-DA1F6A391BBE}"/>
     <dgm:cxn modelId="{DF12B303-54E5-463A-A84E-FE7D822ED772}" srcId="{41AA1F89-4097-4C98-8749-DB7B7B647B18}" destId="{56C055A0-D9F0-4FB9-A237-F2123BB25044}" srcOrd="0" destOrd="0" parTransId="{CE9EA027-813A-4CAA-914E-60DC6E9A6B63}" sibTransId="{9E392A3D-B188-4BC5-8895-BE151463B5FB}"/>
-    <dgm:cxn modelId="{B73A5158-FEBA-4DD6-A9F6-4A2CDAF9337C}" srcId="{41AA1F89-4097-4C98-8749-DB7B7B647B18}" destId="{75108196-0762-4FBC-8585-D5D335248264}" srcOrd="2" destOrd="0" parTransId="{AABC88FC-B5A9-4003-B841-F28A0586BC44}" sibTransId="{916D7D6B-5DDC-40D5-A283-388C66BF1ED0}"/>
-    <dgm:cxn modelId="{179201D4-657D-462C-B7C2-52D1A2711844}" type="presOf" srcId="{5ADA003F-54FF-47E1-ACCC-BBC718499DF5}" destId="{02A31C5A-AFD8-4444-BA7C-EC257E923F37}" srcOrd="0" destOrd="0" presId="urn:microsoft.com/office/officeart/2005/8/layout/cycle3"/>
-    <dgm:cxn modelId="{BFF2757E-8C42-4FE7-BF38-F7F7D53E7449}" type="presOf" srcId="{56C055A0-D9F0-4FB9-A237-F2123BB25044}" destId="{94581017-CD0B-49FE-B542-830E5008D1B8}" srcOrd="0" destOrd="0" presId="urn:microsoft.com/office/officeart/2005/8/layout/cycle3"/>
-    <dgm:cxn modelId="{0CAAE964-C3D8-4BFD-92DC-7B7F3CFEE1DE}" srcId="{41AA1F89-4097-4C98-8749-DB7B7B647B18}" destId="{5ADA003F-54FF-47E1-ACCC-BBC718499DF5}" srcOrd="6" destOrd="0" parTransId="{87E91A11-1A4D-4B89-9815-F8EA08C1FC15}" sibTransId="{E5C7117D-7B8A-4510-921F-164088421800}"/>
-    <dgm:cxn modelId="{5F2B4F43-CFBB-4D72-A7FB-B5F0393F8F09}" type="presOf" srcId="{E9EC61E7-935D-47AE-9394-5775C4F4216F}" destId="{19C0A9BD-468E-4C44-81B9-CEB130F72C20}" srcOrd="0" destOrd="0" presId="urn:microsoft.com/office/officeart/2005/8/layout/cycle3"/>
-    <dgm:cxn modelId="{BE306E19-DC6B-4251-A200-F0061B892E96}" type="presOf" srcId="{41AA1F89-4097-4C98-8749-DB7B7B647B18}" destId="{3585F9A1-360C-49D1-ACFE-7227C7FDC0F8}" srcOrd="0" destOrd="0" presId="urn:microsoft.com/office/officeart/2005/8/layout/cycle3"/>
-    <dgm:cxn modelId="{82850418-4F44-4ABF-BCE1-18BAE3596B98}" type="presOf" srcId="{75108196-0762-4FBC-8585-D5D335248264}" destId="{861C154B-4F25-4EA7-92FB-DEF17F2F59A9}" srcOrd="0" destOrd="0" presId="urn:microsoft.com/office/officeart/2005/8/layout/cycle3"/>
-    <dgm:cxn modelId="{723F3D62-3B31-4F33-96F3-B06C4B082B63}" type="presOf" srcId="{9E392A3D-B188-4BC5-8895-BE151463B5FB}" destId="{FE930957-A3A7-48EC-A289-6333D049AB6E}" srcOrd="0" destOrd="0" presId="urn:microsoft.com/office/officeart/2005/8/layout/cycle3"/>
-    <dgm:cxn modelId="{3FE4076D-A4D5-435B-896E-1B5F847D261F}" type="presOf" srcId="{ED66EC82-850B-4C72-88BC-259393A131BA}" destId="{EFD15585-B419-4FBB-A5D7-6FE6C6271E64}" srcOrd="0" destOrd="0" presId="urn:microsoft.com/office/officeart/2005/8/layout/cycle3"/>
-    <dgm:cxn modelId="{9C40D98B-6C49-4104-939B-6A953176A767}" type="presOf" srcId="{075E7AE5-E457-46D8-BF6E-65BD17F20D8A}" destId="{FBC7ED90-F4B4-4D7C-97EB-0B8332DC727D}" srcOrd="0" destOrd="0" presId="urn:microsoft.com/office/officeart/2005/8/layout/cycle3"/>
-    <dgm:cxn modelId="{128605B4-F9A3-4D1D-B5C9-4F6D6F45D89B}" srcId="{41AA1F89-4097-4C98-8749-DB7B7B647B18}" destId="{4E7474D5-B8FA-4F9A-A228-36D51C64D0C6}" srcOrd="3" destOrd="0" parTransId="{53EE38A2-6341-40FF-AE94-93738AF0C770}" sibTransId="{EF00F98A-6CC1-4143-9C2A-E585711BC5E9}"/>
     <dgm:cxn modelId="{C8F7F327-AA80-4A14-B890-ADDC06C66B42}" type="presParOf" srcId="{3585F9A1-360C-49D1-ACFE-7227C7FDC0F8}" destId="{1892DFC7-10D1-4A21-A710-3BA8536849E8}" srcOrd="0" destOrd="0" presId="urn:microsoft.com/office/officeart/2005/8/layout/cycle3"/>
     <dgm:cxn modelId="{227F2FB1-03C7-43F8-BBDD-54EDACCD3D19}" type="presParOf" srcId="{1892DFC7-10D1-4A21-A710-3BA8536849E8}" destId="{94581017-CD0B-49FE-B542-830E5008D1B8}" srcOrd="0" destOrd="0" presId="urn:microsoft.com/office/officeart/2005/8/layout/cycle3"/>
     <dgm:cxn modelId="{22C36364-357F-4391-B724-EBA54CC7C6BC}" type="presParOf" srcId="{1892DFC7-10D1-4A21-A710-3BA8536849E8}" destId="{FE930957-A3A7-48EC-A289-6333D049AB6E}" srcOrd="1" destOrd="0" presId="urn:microsoft.com/office/officeart/2005/8/layout/cycle3"/>
@@ -2600,10 +2692,10 @@
             </a:spcAft>
           </a:pPr>
           <a:r>
-            <a:rPr lang="en-US" sz="1400" kern="1200" smtClean="0"/>
+            <a:rPr lang="en-US" sz="1400" kern="1200" dirty="0" smtClean="0"/>
             <a:t>Deployment</a:t>
           </a:r>
-          <a:endParaRPr lang="en-US" sz="1400" kern="1200"/>
+          <a:endParaRPr lang="en-US" sz="1400" kern="1200" dirty="0"/>
         </a:p>
       </dsp:txBody>
       <dsp:txXfrm>
@@ -6092,7 +6184,7 @@
             <a:fld id="{77A2ECFD-0169-4599-A79A-8C44AB4A932C}" type="datetimeFigureOut">
               <a:rPr lang="en-US" smtClean="0"/>
               <a:pPr/>
-              <a:t>4/20/2016</a:t>
+              <a:t>5/11/2016</a:t>
             </a:fld>
             <a:endParaRPr lang="en-US"/>
           </a:p>
@@ -6726,7 +6818,7 @@
             <a:fld id="{3FE51E94-D08C-431E-88FC-7EB62E529A19}" type="datetimeFigureOut">
               <a:rPr lang="en-US" smtClean="0"/>
               <a:pPr/>
-              <a:t>4/20/2016</a:t>
+              <a:t>5/11/2016</a:t>
             </a:fld>
             <a:endParaRPr lang="en-US"/>
           </a:p>
@@ -6905,7 +6997,7 @@
             <a:fld id="{3FE51E94-D08C-431E-88FC-7EB62E529A19}" type="datetimeFigureOut">
               <a:rPr lang="en-US" smtClean="0"/>
               <a:pPr/>
-              <a:t>4/20/2016</a:t>
+              <a:t>5/11/2016</a:t>
             </a:fld>
             <a:endParaRPr lang="en-US"/>
           </a:p>
@@ -7087,7 +7179,7 @@
             <a:fld id="{3FE51E94-D08C-431E-88FC-7EB62E529A19}" type="datetimeFigureOut">
               <a:rPr lang="en-US" smtClean="0"/>
               <a:pPr/>
-              <a:t>4/20/2016</a:t>
+              <a:t>5/11/2016</a:t>
             </a:fld>
             <a:endParaRPr lang="en-US"/>
           </a:p>
@@ -7546,7 +7638,7 @@
           <a:p>
             <a:fld id="{D088F999-7A4E-6B4F-9FED-EF75B73AD044}" type="datetimeFigureOut">
               <a:rPr lang="en-US" smtClean="0"/>
-              <a:t>4/20/2016</a:t>
+              <a:t>5/11/2016</a:t>
             </a:fld>
             <a:endParaRPr lang="en-US"/>
           </a:p>
@@ -7716,7 +7808,7 @@
           <a:p>
             <a:fld id="{D088F999-7A4E-6B4F-9FED-EF75B73AD044}" type="datetimeFigureOut">
               <a:rPr lang="en-US" smtClean="0"/>
-              <a:t>4/20/2016</a:t>
+              <a:t>5/11/2016</a:t>
             </a:fld>
             <a:endParaRPr lang="en-US"/>
           </a:p>
@@ -7962,7 +8054,7 @@
           <a:p>
             <a:fld id="{D088F999-7A4E-6B4F-9FED-EF75B73AD044}" type="datetimeFigureOut">
               <a:rPr lang="en-US" smtClean="0"/>
-              <a:t>4/20/2016</a:t>
+              <a:t>5/11/2016</a:t>
             </a:fld>
             <a:endParaRPr lang="en-US"/>
           </a:p>
@@ -8250,7 +8342,7 @@
           <a:p>
             <a:fld id="{D088F999-7A4E-6B4F-9FED-EF75B73AD044}" type="datetimeFigureOut">
               <a:rPr lang="en-US" smtClean="0"/>
-              <a:t>4/20/2016</a:t>
+              <a:t>5/11/2016</a:t>
             </a:fld>
             <a:endParaRPr lang="en-US"/>
           </a:p>
@@ -8672,7 +8764,7 @@
           <a:p>
             <a:fld id="{D088F999-7A4E-6B4F-9FED-EF75B73AD044}" type="datetimeFigureOut">
               <a:rPr lang="en-US" smtClean="0"/>
-              <a:t>4/20/2016</a:t>
+              <a:t>5/11/2016</a:t>
             </a:fld>
             <a:endParaRPr lang="en-US"/>
           </a:p>
@@ -8843,7 +8935,7 @@
             <a:fld id="{3FE51E94-D08C-431E-88FC-7EB62E529A19}" type="datetimeFigureOut">
               <a:rPr lang="en-US" smtClean="0"/>
               <a:pPr/>
-              <a:t>4/20/2016</a:t>
+              <a:t>5/11/2016</a:t>
             </a:fld>
             <a:endParaRPr lang="en-US"/>
           </a:p>
@@ -8962,7 +9054,7 @@
           <a:p>
             <a:fld id="{D088F999-7A4E-6B4F-9FED-EF75B73AD044}" type="datetimeFigureOut">
               <a:rPr lang="en-US" smtClean="0"/>
-              <a:t>4/20/2016</a:t>
+              <a:t>5/11/2016</a:t>
             </a:fld>
             <a:endParaRPr lang="en-US"/>
           </a:p>
@@ -9057,7 +9149,7 @@
           <a:p>
             <a:fld id="{D088F999-7A4E-6B4F-9FED-EF75B73AD044}" type="datetimeFigureOut">
               <a:rPr lang="en-US" smtClean="0"/>
-              <a:t>4/20/2016</a:t>
+              <a:t>5/11/2016</a:t>
             </a:fld>
             <a:endParaRPr lang="en-US"/>
           </a:p>
@@ -9334,7 +9426,7 @@
           <a:p>
             <a:fld id="{D088F999-7A4E-6B4F-9FED-EF75B73AD044}" type="datetimeFigureOut">
               <a:rPr lang="en-US" smtClean="0"/>
-              <a:t>4/20/2016</a:t>
+              <a:t>5/11/2016</a:t>
             </a:fld>
             <a:endParaRPr lang="en-US"/>
           </a:p>
@@ -9587,7 +9679,7 @@
           <a:p>
             <a:fld id="{D088F999-7A4E-6B4F-9FED-EF75B73AD044}" type="datetimeFigureOut">
               <a:rPr lang="en-US" smtClean="0"/>
-              <a:t>4/20/2016</a:t>
+              <a:t>5/11/2016</a:t>
             </a:fld>
             <a:endParaRPr lang="en-US"/>
           </a:p>
@@ -9757,7 +9849,7 @@
           <a:p>
             <a:fld id="{D088F999-7A4E-6B4F-9FED-EF75B73AD044}" type="datetimeFigureOut">
               <a:rPr lang="en-US" smtClean="0"/>
-              <a:t>4/20/2016</a:t>
+              <a:t>5/11/2016</a:t>
             </a:fld>
             <a:endParaRPr lang="en-US"/>
           </a:p>
@@ -9937,7 +10029,7 @@
           <a:p>
             <a:fld id="{D088F999-7A4E-6B4F-9FED-EF75B73AD044}" type="datetimeFigureOut">
               <a:rPr lang="en-US" smtClean="0"/>
-              <a:t>4/20/2016</a:t>
+              <a:t>5/11/2016</a:t>
             </a:fld>
             <a:endParaRPr lang="en-US"/>
           </a:p>
@@ -10184,7 +10276,7 @@
             <a:fld id="{3FE51E94-D08C-431E-88FC-7EB62E529A19}" type="datetimeFigureOut">
               <a:rPr lang="en-US" smtClean="0"/>
               <a:pPr/>
-              <a:t>4/20/2016</a:t>
+              <a:t>5/11/2016</a:t>
             </a:fld>
             <a:endParaRPr lang="en-US"/>
           </a:p>
@@ -10474,7 +10566,7 @@
             <a:fld id="{3FE51E94-D08C-431E-88FC-7EB62E529A19}" type="datetimeFigureOut">
               <a:rPr lang="en-US" smtClean="0"/>
               <a:pPr/>
-              <a:t>4/20/2016</a:t>
+              <a:t>5/11/2016</a:t>
             </a:fld>
             <a:endParaRPr lang="en-US"/>
           </a:p>
@@ -10903,7 +10995,7 @@
             <a:fld id="{3FE51E94-D08C-431E-88FC-7EB62E529A19}" type="datetimeFigureOut">
               <a:rPr lang="en-US" smtClean="0"/>
               <a:pPr/>
-              <a:t>4/20/2016</a:t>
+              <a:t>5/11/2016</a:t>
             </a:fld>
             <a:endParaRPr lang="en-US"/>
           </a:p>
@@ -11023,7 +11115,7 @@
             <a:fld id="{3FE51E94-D08C-431E-88FC-7EB62E529A19}" type="datetimeFigureOut">
               <a:rPr lang="en-US" smtClean="0"/>
               <a:pPr/>
-              <a:t>4/20/2016</a:t>
+              <a:t>5/11/2016</a:t>
             </a:fld>
             <a:endParaRPr lang="en-US"/>
           </a:p>
@@ -11120,7 +11212,7 @@
             <a:fld id="{3FE51E94-D08C-431E-88FC-7EB62E529A19}" type="datetimeFigureOut">
               <a:rPr lang="en-US" smtClean="0"/>
               <a:pPr/>
-              <a:t>4/20/2016</a:t>
+              <a:t>5/11/2016</a:t>
             </a:fld>
             <a:endParaRPr lang="en-US"/>
           </a:p>
@@ -11399,7 +11491,7 @@
             <a:fld id="{3FE51E94-D08C-431E-88FC-7EB62E529A19}" type="datetimeFigureOut">
               <a:rPr lang="en-US" smtClean="0"/>
               <a:pPr/>
-              <a:t>4/20/2016</a:t>
+              <a:t>5/11/2016</a:t>
             </a:fld>
             <a:endParaRPr lang="en-US"/>
           </a:p>
@@ -11654,7 +11746,7 @@
             <a:fld id="{3FE51E94-D08C-431E-88FC-7EB62E529A19}" type="datetimeFigureOut">
               <a:rPr lang="en-US" smtClean="0"/>
               <a:pPr/>
-              <a:t>4/20/2016</a:t>
+              <a:t>5/11/2016</a:t>
             </a:fld>
             <a:endParaRPr lang="en-US"/>
           </a:p>
@@ -11876,7 +11968,7 @@
             <a:fld id="{3FE51E94-D08C-431E-88FC-7EB62E529A19}" type="datetimeFigureOut">
               <a:rPr lang="en-US" smtClean="0"/>
               <a:pPr/>
-              <a:t>4/20/2016</a:t>
+              <a:t>5/11/2016</a:t>
             </a:fld>
             <a:endParaRPr lang="en-US"/>
           </a:p>
@@ -12404,7 +12496,7 @@
           <a:p>
             <a:fld id="{D088F999-7A4E-6B4F-9FED-EF75B73AD044}" type="datetimeFigureOut">
               <a:rPr lang="en-US" smtClean="0"/>
-              <a:t>4/20/2016</a:t>
+              <a:t>5/11/2016</a:t>
             </a:fld>
             <a:endParaRPr lang="en-US"/>
           </a:p>
@@ -13484,6 +13576,13 @@
   <p:clrMapOvr>
     <a:masterClrMapping/>
   </p:clrMapOvr>
+  <p:timing>
+    <p:tnLst>
+      <p:par>
+        <p:cTn id="1" dur="indefinite" restart="never" nodeType="tmRoot"/>
+      </p:par>
+    </p:tnLst>
+  </p:timing>
 </p:sld>
 </file>
 
@@ -13572,6 +13671,207 @@
   <p:clrMapOvr>
     <a:masterClrMapping/>
   </p:clrMapOvr>
+  <p:timing>
+    <p:tnLst>
+      <p:par>
+        <p:cTn id="1" dur="indefinite" restart="never" nodeType="tmRoot">
+          <p:childTnLst>
+            <p:seq concurrent="1" nextAc="seek">
+              <p:cTn id="2" dur="indefinite" nodeType="mainSeq">
+                <p:childTnLst>
+                  <p:par>
+                    <p:cTn id="3" fill="hold">
+                      <p:stCondLst>
+                        <p:cond delay="indefinite"/>
+                        <p:cond evt="onBegin" delay="0">
+                          <p:tn val="2"/>
+                        </p:cond>
+                      </p:stCondLst>
+                      <p:childTnLst>
+                        <p:par>
+                          <p:cTn id="4" fill="hold">
+                            <p:stCondLst>
+                              <p:cond delay="0"/>
+                            </p:stCondLst>
+                            <p:childTnLst>
+                              <p:par>
+                                <p:cTn id="5" presetID="10" presetClass="entr" presetSubtype="0" fill="hold" grpId="0" nodeType="afterEffect">
+                                  <p:stCondLst>
+                                    <p:cond delay="0"/>
+                                  </p:stCondLst>
+                                  <p:childTnLst>
+                                    <p:set>
+                                      <p:cBhvr>
+                                        <p:cTn id="6" dur="1" fill="hold">
+                                          <p:stCondLst>
+                                            <p:cond delay="0"/>
+                                          </p:stCondLst>
+                                        </p:cTn>
+                                        <p:tgtEl>
+                                          <p:spTgt spid="3">
+                                            <p:txEl>
+                                              <p:pRg st="0" end="0"/>
+                                            </p:txEl>
+                                          </p:spTgt>
+                                        </p:tgtEl>
+                                        <p:attrNameLst>
+                                          <p:attrName>style.visibility</p:attrName>
+                                        </p:attrNameLst>
+                                      </p:cBhvr>
+                                      <p:to>
+                                        <p:strVal val="visible"/>
+                                      </p:to>
+                                    </p:set>
+                                    <p:animEffect transition="in" filter="fade">
+                                      <p:cBhvr>
+                                        <p:cTn id="7" dur="500"/>
+                                        <p:tgtEl>
+                                          <p:spTgt spid="3">
+                                            <p:txEl>
+                                              <p:pRg st="0" end="0"/>
+                                            </p:txEl>
+                                          </p:spTgt>
+                                        </p:tgtEl>
+                                      </p:cBhvr>
+                                    </p:animEffect>
+                                  </p:childTnLst>
+                                </p:cTn>
+                              </p:par>
+                            </p:childTnLst>
+                          </p:cTn>
+                        </p:par>
+                        <p:par>
+                          <p:cTn id="8" fill="hold">
+                            <p:stCondLst>
+                              <p:cond delay="500"/>
+                            </p:stCondLst>
+                            <p:childTnLst>
+                              <p:par>
+                                <p:cTn id="9" presetID="10" presetClass="entr" presetSubtype="0" fill="hold" grpId="0" nodeType="afterEffect">
+                                  <p:stCondLst>
+                                    <p:cond delay="0"/>
+                                  </p:stCondLst>
+                                  <p:childTnLst>
+                                    <p:set>
+                                      <p:cBhvr>
+                                        <p:cTn id="10" dur="1" fill="hold">
+                                          <p:stCondLst>
+                                            <p:cond delay="0"/>
+                                          </p:stCondLst>
+                                        </p:cTn>
+                                        <p:tgtEl>
+                                          <p:spTgt spid="3">
+                                            <p:txEl>
+                                              <p:pRg st="1" end="1"/>
+                                            </p:txEl>
+                                          </p:spTgt>
+                                        </p:tgtEl>
+                                        <p:attrNameLst>
+                                          <p:attrName>style.visibility</p:attrName>
+                                        </p:attrNameLst>
+                                      </p:cBhvr>
+                                      <p:to>
+                                        <p:strVal val="visible"/>
+                                      </p:to>
+                                    </p:set>
+                                    <p:animEffect transition="in" filter="fade">
+                                      <p:cBhvr>
+                                        <p:cTn id="11" dur="500"/>
+                                        <p:tgtEl>
+                                          <p:spTgt spid="3">
+                                            <p:txEl>
+                                              <p:pRg st="1" end="1"/>
+                                            </p:txEl>
+                                          </p:spTgt>
+                                        </p:tgtEl>
+                                      </p:cBhvr>
+                                    </p:animEffect>
+                                  </p:childTnLst>
+                                </p:cTn>
+                              </p:par>
+                            </p:childTnLst>
+                          </p:cTn>
+                        </p:par>
+                        <p:par>
+                          <p:cTn id="12" fill="hold">
+                            <p:stCondLst>
+                              <p:cond delay="1000"/>
+                            </p:stCondLst>
+                            <p:childTnLst>
+                              <p:par>
+                                <p:cTn id="13" presetID="10" presetClass="entr" presetSubtype="0" fill="hold" grpId="0" nodeType="afterEffect">
+                                  <p:stCondLst>
+                                    <p:cond delay="0"/>
+                                  </p:stCondLst>
+                                  <p:childTnLst>
+                                    <p:set>
+                                      <p:cBhvr>
+                                        <p:cTn id="14" dur="1" fill="hold">
+                                          <p:stCondLst>
+                                            <p:cond delay="0"/>
+                                          </p:stCondLst>
+                                        </p:cTn>
+                                        <p:tgtEl>
+                                          <p:spTgt spid="3">
+                                            <p:txEl>
+                                              <p:pRg st="2" end="2"/>
+                                            </p:txEl>
+                                          </p:spTgt>
+                                        </p:tgtEl>
+                                        <p:attrNameLst>
+                                          <p:attrName>style.visibility</p:attrName>
+                                        </p:attrNameLst>
+                                      </p:cBhvr>
+                                      <p:to>
+                                        <p:strVal val="visible"/>
+                                      </p:to>
+                                    </p:set>
+                                    <p:animEffect transition="in" filter="fade">
+                                      <p:cBhvr>
+                                        <p:cTn id="15" dur="500"/>
+                                        <p:tgtEl>
+                                          <p:spTgt spid="3">
+                                            <p:txEl>
+                                              <p:pRg st="2" end="2"/>
+                                            </p:txEl>
+                                          </p:spTgt>
+                                        </p:tgtEl>
+                                      </p:cBhvr>
+                                    </p:animEffect>
+                                  </p:childTnLst>
+                                </p:cTn>
+                              </p:par>
+                            </p:childTnLst>
+                          </p:cTn>
+                        </p:par>
+                      </p:childTnLst>
+                    </p:cTn>
+                  </p:par>
+                </p:childTnLst>
+              </p:cTn>
+              <p:prevCondLst>
+                <p:cond evt="onPrev" delay="0">
+                  <p:tgtEl>
+                    <p:sldTgt/>
+                  </p:tgtEl>
+                </p:cond>
+              </p:prevCondLst>
+              <p:nextCondLst>
+                <p:cond evt="onNext" delay="0">
+                  <p:tgtEl>
+                    <p:sldTgt/>
+                  </p:tgtEl>
+                </p:cond>
+              </p:nextCondLst>
+            </p:seq>
+          </p:childTnLst>
+        </p:cTn>
+      </p:par>
+    </p:tnLst>
+    <p:bldLst>
+      <p:bldP spid="3" grpId="0" uiExpand="1" build="p"/>
+    </p:bldLst>
+  </p:timing>
 </p:sld>
 </file>
 
@@ -19897,6 +20197,13 @@
   <p:clrMapOvr>
     <a:masterClrMapping/>
   </p:clrMapOvr>
+  <p:timing>
+    <p:tnLst>
+      <p:par>
+        <p:cTn id="1" dur="indefinite" restart="never" nodeType="tmRoot"/>
+      </p:par>
+    </p:tnLst>
+  </p:timing>
 </p:sld>
 </file>
 
@@ -21344,19 +21651,19 @@
             </a:r>
             <a:r>
               <a:rPr lang="en-US" dirty="0" smtClean="0"/>
-              <a:t> events every time data changes or binding should be refreshed</a:t>
-            </a:r>
-          </a:p>
-          <a:p>
-            <a:r>
-              <a:rPr lang="en-US" dirty="0" err="1" smtClean="0"/>
-              <a:t>MvvmCross</a:t>
+              <a:t> events every time data changes or binding should be </a:t>
             </a:r>
             <a:r>
               <a:rPr lang="en-US" dirty="0" smtClean="0"/>
-              <a:t> helps with this</a:t>
-            </a:r>
-            <a:endParaRPr lang="en-US" dirty="0"/>
+              <a:t>refreshed</a:t>
+            </a:r>
+          </a:p>
+          <a:p>
+            <a:r>
+              <a:rPr lang="en-US" dirty="0" smtClean="0"/>
+              <a:t>MVVM frameworks can help with this</a:t>
+            </a:r>
+            <a:endParaRPr lang="en-US" dirty="0" smtClean="0"/>
           </a:p>
         </p:txBody>
       </p:sp>
@@ -23150,6 +23457,13 @@
   <p:clrMapOvr>
     <a:masterClrMapping/>
   </p:clrMapOvr>
+  <p:timing>
+    <p:tnLst>
+      <p:par>
+        <p:cTn id="1" dur="indefinite" restart="never" nodeType="tmRoot"/>
+      </p:par>
+    </p:tnLst>
+  </p:timing>
 </p:sld>
 </file>
 
@@ -25377,15 +25691,24 @@
                                   </p:childTnLst>
                                 </p:cTn>
                               </p:par>
+                            </p:childTnLst>
+                          </p:cTn>
+                        </p:par>
+                        <p:par>
+                          <p:cTn id="13" fill="hold">
+                            <p:stCondLst>
+                              <p:cond delay="500"/>
+                            </p:stCondLst>
+                            <p:childTnLst>
                               <p:par>
-                                <p:cTn id="13" presetID="10" presetClass="entr" presetSubtype="0" fill="hold" grpId="0" nodeType="withEffect">
+                                <p:cTn id="14" presetID="10" presetClass="entr" presetSubtype="0" fill="hold" grpId="0" nodeType="afterEffect">
                                   <p:stCondLst>
                                     <p:cond delay="0"/>
                                   </p:stCondLst>
                                   <p:childTnLst>
                                     <p:set>
                                       <p:cBhvr>
-                                        <p:cTn id="14" dur="1" fill="hold">
+                                        <p:cTn id="15" dur="1" fill="hold">
                                           <p:stCondLst>
                                             <p:cond delay="0"/>
                                           </p:stCondLst>
@@ -25407,7 +25730,7 @@
                                     </p:set>
                                     <p:animEffect transition="in" filter="fade">
                                       <p:cBhvr>
-                                        <p:cTn id="15" dur="500"/>
+                                        <p:cTn id="16" dur="500"/>
                                         <p:tgtEl>
                                           <p:spTgt spid="3">
                                             <p:txEl>
@@ -25448,7 +25771,7 @@
       </p:par>
     </p:tnLst>
     <p:bldLst>
-      <p:bldP spid="3" grpId="0" build="p"/>
+      <p:bldP spid="3" grpId="0" uiExpand="1" build="p"/>
     </p:bldLst>
   </p:timing>
 </p:sld>
@@ -28158,6 +28481,13 @@
   <p:clrMapOvr>
     <a:masterClrMapping/>
   </p:clrMapOvr>
+  <p:timing>
+    <p:tnLst>
+      <p:par>
+        <p:cTn id="1" dur="indefinite" restart="never" nodeType="tmRoot"/>
+      </p:par>
+    </p:tnLst>
+  </p:timing>
 </p:sld>
 </file>
 
@@ -28492,7 +28822,7 @@
                             </p:stCondLst>
                             <p:childTnLst>
                               <p:par>
-                                <p:cTn id="5" presetID="10" presetClass="entr" presetSubtype="0" fill="hold" grpId="0" nodeType="withEffect">
+                                <p:cTn id="5" presetID="10" presetClass="entr" presetSubtype="0" fill="hold" grpId="0" nodeType="afterEffect">
                                   <p:stCondLst>
                                     <p:cond delay="0"/>
                                   </p:stCondLst>
@@ -28528,6 +28858,41 @@
                                               <p:pRg st="0" end="0"/>
                                             </p:txEl>
                                           </p:spTgt>
+                                        </p:tgtEl>
+                                      </p:cBhvr>
+                                    </p:animEffect>
+                                  </p:childTnLst>
+                                </p:cTn>
+                              </p:par>
+                              <p:par>
+                                <p:cTn id="8" presetID="10" presetClass="entr" presetSubtype="0" fill="hold" nodeType="withEffect">
+                                  <p:stCondLst>
+                                    <p:cond delay="0"/>
+                                  </p:stCondLst>
+                                  <p:childTnLst>
+                                    <p:set>
+                                      <p:cBhvr>
+                                        <p:cTn id="9" dur="1" fill="hold">
+                                          <p:stCondLst>
+                                            <p:cond delay="0"/>
+                                          </p:stCondLst>
+                                        </p:cTn>
+                                        <p:tgtEl>
+                                          <p:spTgt spid="2050"/>
+                                        </p:tgtEl>
+                                        <p:attrNameLst>
+                                          <p:attrName>style.visibility</p:attrName>
+                                        </p:attrNameLst>
+                                      </p:cBhvr>
+                                      <p:to>
+                                        <p:strVal val="visible"/>
+                                      </p:to>
+                                    </p:set>
+                                    <p:animEffect transition="in" filter="fade">
+                                      <p:cBhvr>
+                                        <p:cTn id="10" dur="500"/>
+                                        <p:tgtEl>
+                                          <p:spTgt spid="2050"/>
                                         </p:tgtEl>
                                       </p:cBhvr>
                                     </p:animEffect>
@@ -28643,6 +29008,471 @@
   <p:clrMapOvr>
     <a:masterClrMapping/>
   </p:clrMapOvr>
+  <p:timing>
+    <p:tnLst>
+      <p:par>
+        <p:cTn id="1" dur="indefinite" restart="never" nodeType="tmRoot">
+          <p:childTnLst>
+            <p:seq concurrent="1" nextAc="seek">
+              <p:cTn id="2" dur="indefinite" nodeType="mainSeq">
+                <p:childTnLst>
+                  <p:par>
+                    <p:cTn id="3" fill="hold">
+                      <p:stCondLst>
+                        <p:cond delay="indefinite"/>
+                        <p:cond evt="onBegin" delay="0">
+                          <p:tn val="2"/>
+                        </p:cond>
+                      </p:stCondLst>
+                      <p:childTnLst>
+                        <p:par>
+                          <p:cTn id="4" fill="hold">
+                            <p:stCondLst>
+                              <p:cond delay="0"/>
+                            </p:stCondLst>
+                            <p:childTnLst>
+                              <p:par>
+                                <p:cTn id="5" presetID="10" presetClass="entr" presetSubtype="0" fill="hold" grpId="0" nodeType="afterEffect">
+                                  <p:stCondLst>
+                                    <p:cond delay="0"/>
+                                  </p:stCondLst>
+                                  <p:childTnLst>
+                                    <p:set>
+                                      <p:cBhvr>
+                                        <p:cTn id="6" dur="1" fill="hold">
+                                          <p:stCondLst>
+                                            <p:cond delay="0"/>
+                                          </p:stCondLst>
+                                        </p:cTn>
+                                        <p:tgtEl>
+                                          <p:spTgt spid="4">
+                                            <p:graphicEl>
+                                              <a:dgm id="{94581017-CD0B-49FE-B542-830E5008D1B8}"/>
+                                            </p:graphicEl>
+                                          </p:spTgt>
+                                        </p:tgtEl>
+                                        <p:attrNameLst>
+                                          <p:attrName>style.visibility</p:attrName>
+                                        </p:attrNameLst>
+                                      </p:cBhvr>
+                                      <p:to>
+                                        <p:strVal val="visible"/>
+                                      </p:to>
+                                    </p:set>
+                                    <p:animEffect transition="in" filter="fade">
+                                      <p:cBhvr>
+                                        <p:cTn id="7" dur="500"/>
+                                        <p:tgtEl>
+                                          <p:spTgt spid="4">
+                                            <p:graphicEl>
+                                              <a:dgm id="{94581017-CD0B-49FE-B542-830E5008D1B8}"/>
+                                            </p:graphicEl>
+                                          </p:spTgt>
+                                        </p:tgtEl>
+                                      </p:cBhvr>
+                                    </p:animEffect>
+                                  </p:childTnLst>
+                                </p:cTn>
+                              </p:par>
+                            </p:childTnLst>
+                          </p:cTn>
+                        </p:par>
+                        <p:par>
+                          <p:cTn id="8" fill="hold">
+                            <p:stCondLst>
+                              <p:cond delay="500"/>
+                            </p:stCondLst>
+                            <p:childTnLst>
+                              <p:par>
+                                <p:cTn id="9" presetID="10" presetClass="entr" presetSubtype="0" fill="hold" grpId="0" nodeType="afterEffect">
+                                  <p:stCondLst>
+                                    <p:cond delay="0"/>
+                                  </p:stCondLst>
+                                  <p:childTnLst>
+                                    <p:set>
+                                      <p:cBhvr>
+                                        <p:cTn id="10" dur="1" fill="hold">
+                                          <p:stCondLst>
+                                            <p:cond delay="0"/>
+                                          </p:stCondLst>
+                                        </p:cTn>
+                                        <p:tgtEl>
+                                          <p:spTgt spid="4">
+                                            <p:graphicEl>
+                                              <a:dgm id="{FE930957-A3A7-48EC-A289-6333D049AB6E}"/>
+                                            </p:graphicEl>
+                                          </p:spTgt>
+                                        </p:tgtEl>
+                                        <p:attrNameLst>
+                                          <p:attrName>style.visibility</p:attrName>
+                                        </p:attrNameLst>
+                                      </p:cBhvr>
+                                      <p:to>
+                                        <p:strVal val="visible"/>
+                                      </p:to>
+                                    </p:set>
+                                    <p:animEffect transition="in" filter="fade">
+                                      <p:cBhvr>
+                                        <p:cTn id="11" dur="500"/>
+                                        <p:tgtEl>
+                                          <p:spTgt spid="4">
+                                            <p:graphicEl>
+                                              <a:dgm id="{FE930957-A3A7-48EC-A289-6333D049AB6E}"/>
+                                            </p:graphicEl>
+                                          </p:spTgt>
+                                        </p:tgtEl>
+                                      </p:cBhvr>
+                                    </p:animEffect>
+                                  </p:childTnLst>
+                                </p:cTn>
+                              </p:par>
+                            </p:childTnLst>
+                          </p:cTn>
+                        </p:par>
+                        <p:par>
+                          <p:cTn id="12" fill="hold">
+                            <p:stCondLst>
+                              <p:cond delay="1000"/>
+                            </p:stCondLst>
+                            <p:childTnLst>
+                              <p:par>
+                                <p:cTn id="13" presetID="10" presetClass="entr" presetSubtype="0" fill="hold" grpId="0" nodeType="afterEffect">
+                                  <p:stCondLst>
+                                    <p:cond delay="0"/>
+                                  </p:stCondLst>
+                                  <p:childTnLst>
+                                    <p:set>
+                                      <p:cBhvr>
+                                        <p:cTn id="14" dur="1" fill="hold">
+                                          <p:stCondLst>
+                                            <p:cond delay="0"/>
+                                          </p:stCondLst>
+                                        </p:cTn>
+                                        <p:tgtEl>
+                                          <p:spTgt spid="4">
+                                            <p:graphicEl>
+                                              <a:dgm id="{19C0A9BD-468E-4C44-81B9-CEB130F72C20}"/>
+                                            </p:graphicEl>
+                                          </p:spTgt>
+                                        </p:tgtEl>
+                                        <p:attrNameLst>
+                                          <p:attrName>style.visibility</p:attrName>
+                                        </p:attrNameLst>
+                                      </p:cBhvr>
+                                      <p:to>
+                                        <p:strVal val="visible"/>
+                                      </p:to>
+                                    </p:set>
+                                    <p:animEffect transition="in" filter="fade">
+                                      <p:cBhvr>
+                                        <p:cTn id="15" dur="500"/>
+                                        <p:tgtEl>
+                                          <p:spTgt spid="4">
+                                            <p:graphicEl>
+                                              <a:dgm id="{19C0A9BD-468E-4C44-81B9-CEB130F72C20}"/>
+                                            </p:graphicEl>
+                                          </p:spTgt>
+                                        </p:tgtEl>
+                                      </p:cBhvr>
+                                    </p:animEffect>
+                                  </p:childTnLst>
+                                </p:cTn>
+                              </p:par>
+                            </p:childTnLst>
+                          </p:cTn>
+                        </p:par>
+                        <p:par>
+                          <p:cTn id="16" fill="hold">
+                            <p:stCondLst>
+                              <p:cond delay="1500"/>
+                            </p:stCondLst>
+                            <p:childTnLst>
+                              <p:par>
+                                <p:cTn id="17" presetID="10" presetClass="entr" presetSubtype="0" fill="hold" grpId="0" nodeType="afterEffect">
+                                  <p:stCondLst>
+                                    <p:cond delay="0"/>
+                                  </p:stCondLst>
+                                  <p:childTnLst>
+                                    <p:set>
+                                      <p:cBhvr>
+                                        <p:cTn id="18" dur="1" fill="hold">
+                                          <p:stCondLst>
+                                            <p:cond delay="0"/>
+                                          </p:stCondLst>
+                                        </p:cTn>
+                                        <p:tgtEl>
+                                          <p:spTgt spid="4">
+                                            <p:graphicEl>
+                                              <a:dgm id="{861C154B-4F25-4EA7-92FB-DEF17F2F59A9}"/>
+                                            </p:graphicEl>
+                                          </p:spTgt>
+                                        </p:tgtEl>
+                                        <p:attrNameLst>
+                                          <p:attrName>style.visibility</p:attrName>
+                                        </p:attrNameLst>
+                                      </p:cBhvr>
+                                      <p:to>
+                                        <p:strVal val="visible"/>
+                                      </p:to>
+                                    </p:set>
+                                    <p:animEffect transition="in" filter="fade">
+                                      <p:cBhvr>
+                                        <p:cTn id="19" dur="500"/>
+                                        <p:tgtEl>
+                                          <p:spTgt spid="4">
+                                            <p:graphicEl>
+                                              <a:dgm id="{861C154B-4F25-4EA7-92FB-DEF17F2F59A9}"/>
+                                            </p:graphicEl>
+                                          </p:spTgt>
+                                        </p:tgtEl>
+                                      </p:cBhvr>
+                                    </p:animEffect>
+                                  </p:childTnLst>
+                                </p:cTn>
+                              </p:par>
+                            </p:childTnLst>
+                          </p:cTn>
+                        </p:par>
+                        <p:par>
+                          <p:cTn id="20" fill="hold">
+                            <p:stCondLst>
+                              <p:cond delay="2000"/>
+                            </p:stCondLst>
+                            <p:childTnLst>
+                              <p:par>
+                                <p:cTn id="21" presetID="10" presetClass="entr" presetSubtype="0" fill="hold" grpId="0" nodeType="afterEffect">
+                                  <p:stCondLst>
+                                    <p:cond delay="0"/>
+                                  </p:stCondLst>
+                                  <p:childTnLst>
+                                    <p:set>
+                                      <p:cBhvr>
+                                        <p:cTn id="22" dur="1" fill="hold">
+                                          <p:stCondLst>
+                                            <p:cond delay="0"/>
+                                          </p:stCondLst>
+                                        </p:cTn>
+                                        <p:tgtEl>
+                                          <p:spTgt spid="4">
+                                            <p:graphicEl>
+                                              <a:dgm id="{4E5ACDAF-2FE1-4685-852D-3D6548605A78}"/>
+                                            </p:graphicEl>
+                                          </p:spTgt>
+                                        </p:tgtEl>
+                                        <p:attrNameLst>
+                                          <p:attrName>style.visibility</p:attrName>
+                                        </p:attrNameLst>
+                                      </p:cBhvr>
+                                      <p:to>
+                                        <p:strVal val="visible"/>
+                                      </p:to>
+                                    </p:set>
+                                    <p:animEffect transition="in" filter="fade">
+                                      <p:cBhvr>
+                                        <p:cTn id="23" dur="500"/>
+                                        <p:tgtEl>
+                                          <p:spTgt spid="4">
+                                            <p:graphicEl>
+                                              <a:dgm id="{4E5ACDAF-2FE1-4685-852D-3D6548605A78}"/>
+                                            </p:graphicEl>
+                                          </p:spTgt>
+                                        </p:tgtEl>
+                                      </p:cBhvr>
+                                    </p:animEffect>
+                                  </p:childTnLst>
+                                </p:cTn>
+                              </p:par>
+                            </p:childTnLst>
+                          </p:cTn>
+                        </p:par>
+                        <p:par>
+                          <p:cTn id="24" fill="hold">
+                            <p:stCondLst>
+                              <p:cond delay="2500"/>
+                            </p:stCondLst>
+                            <p:childTnLst>
+                              <p:par>
+                                <p:cTn id="25" presetID="10" presetClass="entr" presetSubtype="0" fill="hold" grpId="0" nodeType="afterEffect">
+                                  <p:stCondLst>
+                                    <p:cond delay="0"/>
+                                  </p:stCondLst>
+                                  <p:childTnLst>
+                                    <p:set>
+                                      <p:cBhvr>
+                                        <p:cTn id="26" dur="1" fill="hold">
+                                          <p:stCondLst>
+                                            <p:cond delay="0"/>
+                                          </p:stCondLst>
+                                        </p:cTn>
+                                        <p:tgtEl>
+                                          <p:spTgt spid="4">
+                                            <p:graphicEl>
+                                              <a:dgm id="{EFD15585-B419-4FBB-A5D7-6FE6C6271E64}"/>
+                                            </p:graphicEl>
+                                          </p:spTgt>
+                                        </p:tgtEl>
+                                        <p:attrNameLst>
+                                          <p:attrName>style.visibility</p:attrName>
+                                        </p:attrNameLst>
+                                      </p:cBhvr>
+                                      <p:to>
+                                        <p:strVal val="visible"/>
+                                      </p:to>
+                                    </p:set>
+                                    <p:animEffect transition="in" filter="fade">
+                                      <p:cBhvr>
+                                        <p:cTn id="27" dur="500"/>
+                                        <p:tgtEl>
+                                          <p:spTgt spid="4">
+                                            <p:graphicEl>
+                                              <a:dgm id="{EFD15585-B419-4FBB-A5D7-6FE6C6271E64}"/>
+                                            </p:graphicEl>
+                                          </p:spTgt>
+                                        </p:tgtEl>
+                                      </p:cBhvr>
+                                    </p:animEffect>
+                                  </p:childTnLst>
+                                </p:cTn>
+                              </p:par>
+                            </p:childTnLst>
+                          </p:cTn>
+                        </p:par>
+                        <p:par>
+                          <p:cTn id="28" fill="hold">
+                            <p:stCondLst>
+                              <p:cond delay="3000"/>
+                            </p:stCondLst>
+                            <p:childTnLst>
+                              <p:par>
+                                <p:cTn id="29" presetID="10" presetClass="entr" presetSubtype="0" fill="hold" grpId="0" nodeType="afterEffect">
+                                  <p:stCondLst>
+                                    <p:cond delay="0"/>
+                                  </p:stCondLst>
+                                  <p:childTnLst>
+                                    <p:set>
+                                      <p:cBhvr>
+                                        <p:cTn id="30" dur="1" fill="hold">
+                                          <p:stCondLst>
+                                            <p:cond delay="0"/>
+                                          </p:stCondLst>
+                                        </p:cTn>
+                                        <p:tgtEl>
+                                          <p:spTgt spid="4">
+                                            <p:graphicEl>
+                                              <a:dgm id="{FBC7ED90-F4B4-4D7C-97EB-0B8332DC727D}"/>
+                                            </p:graphicEl>
+                                          </p:spTgt>
+                                        </p:tgtEl>
+                                        <p:attrNameLst>
+                                          <p:attrName>style.visibility</p:attrName>
+                                        </p:attrNameLst>
+                                      </p:cBhvr>
+                                      <p:to>
+                                        <p:strVal val="visible"/>
+                                      </p:to>
+                                    </p:set>
+                                    <p:animEffect transition="in" filter="fade">
+                                      <p:cBhvr>
+                                        <p:cTn id="31" dur="500"/>
+                                        <p:tgtEl>
+                                          <p:spTgt spid="4">
+                                            <p:graphicEl>
+                                              <a:dgm id="{FBC7ED90-F4B4-4D7C-97EB-0B8332DC727D}"/>
+                                            </p:graphicEl>
+                                          </p:spTgt>
+                                        </p:tgtEl>
+                                      </p:cBhvr>
+                                    </p:animEffect>
+                                  </p:childTnLst>
+                                </p:cTn>
+                              </p:par>
+                            </p:childTnLst>
+                          </p:cTn>
+                        </p:par>
+                        <p:par>
+                          <p:cTn id="32" fill="hold">
+                            <p:stCondLst>
+                              <p:cond delay="3500"/>
+                            </p:stCondLst>
+                            <p:childTnLst>
+                              <p:par>
+                                <p:cTn id="33" presetID="10" presetClass="entr" presetSubtype="0" fill="hold" grpId="0" nodeType="afterEffect">
+                                  <p:stCondLst>
+                                    <p:cond delay="0"/>
+                                  </p:stCondLst>
+                                  <p:childTnLst>
+                                    <p:set>
+                                      <p:cBhvr>
+                                        <p:cTn id="34" dur="1" fill="hold">
+                                          <p:stCondLst>
+                                            <p:cond delay="0"/>
+                                          </p:stCondLst>
+                                        </p:cTn>
+                                        <p:tgtEl>
+                                          <p:spTgt spid="4">
+                                            <p:graphicEl>
+                                              <a:dgm id="{02A31C5A-AFD8-4444-BA7C-EC257E923F37}"/>
+                                            </p:graphicEl>
+                                          </p:spTgt>
+                                        </p:tgtEl>
+                                        <p:attrNameLst>
+                                          <p:attrName>style.visibility</p:attrName>
+                                        </p:attrNameLst>
+                                      </p:cBhvr>
+                                      <p:to>
+                                        <p:strVal val="visible"/>
+                                      </p:to>
+                                    </p:set>
+                                    <p:animEffect transition="in" filter="fade">
+                                      <p:cBhvr>
+                                        <p:cTn id="35" dur="500"/>
+                                        <p:tgtEl>
+                                          <p:spTgt spid="4">
+                                            <p:graphicEl>
+                                              <a:dgm id="{02A31C5A-AFD8-4444-BA7C-EC257E923F37}"/>
+                                            </p:graphicEl>
+                                          </p:spTgt>
+                                        </p:tgtEl>
+                                      </p:cBhvr>
+                                    </p:animEffect>
+                                  </p:childTnLst>
+                                </p:cTn>
+                              </p:par>
+                            </p:childTnLst>
+                          </p:cTn>
+                        </p:par>
+                      </p:childTnLst>
+                    </p:cTn>
+                  </p:par>
+                </p:childTnLst>
+              </p:cTn>
+              <p:prevCondLst>
+                <p:cond evt="onPrev" delay="0">
+                  <p:tgtEl>
+                    <p:sldTgt/>
+                  </p:tgtEl>
+                </p:cond>
+              </p:prevCondLst>
+              <p:nextCondLst>
+                <p:cond evt="onNext" delay="0">
+                  <p:tgtEl>
+                    <p:sldTgt/>
+                  </p:tgtEl>
+                </p:cond>
+              </p:nextCondLst>
+            </p:seq>
+          </p:childTnLst>
+        </p:cTn>
+      </p:par>
+    </p:tnLst>
+    <p:bldLst>
+      <p:bldGraphic spid="4" grpId="0" uiExpand="1">
+        <p:bldSub>
+          <a:bldDgm bld="one"/>
+        </p:bldSub>
+      </p:bldGraphic>
+    </p:bldLst>
+  </p:timing>
 </p:sld>
 </file>
 
@@ -28715,6 +29545,13 @@
   <p:clrMapOvr>
     <a:masterClrMapping/>
   </p:clrMapOvr>
+  <p:timing>
+    <p:tnLst>
+      <p:par>
+        <p:cTn id="1" dur="indefinite" restart="never" nodeType="tmRoot"/>
+      </p:par>
+    </p:tnLst>
+  </p:timing>
 </p:sld>
 </file>
 
@@ -28797,6 +29634,161 @@
   <p:clrMapOvr>
     <a:masterClrMapping/>
   </p:clrMapOvr>
+  <p:timing>
+    <p:tnLst>
+      <p:par>
+        <p:cTn id="1" dur="indefinite" restart="never" nodeType="tmRoot">
+          <p:childTnLst>
+            <p:seq concurrent="1" nextAc="seek">
+              <p:cTn id="2" dur="indefinite" nodeType="mainSeq">
+                <p:childTnLst>
+                  <p:par>
+                    <p:cTn id="3" fill="hold">
+                      <p:stCondLst>
+                        <p:cond delay="indefinite"/>
+                      </p:stCondLst>
+                      <p:childTnLst>
+                        <p:par>
+                          <p:cTn id="4" fill="hold">
+                            <p:stCondLst>
+                              <p:cond delay="0"/>
+                            </p:stCondLst>
+                            <p:childTnLst>
+                              <p:par>
+                                <p:cTn id="5" presetID="10" presetClass="entr" presetSubtype="0" fill="hold" grpId="0" nodeType="clickEffect">
+                                  <p:stCondLst>
+                                    <p:cond delay="0"/>
+                                  </p:stCondLst>
+                                  <p:childTnLst>
+                                    <p:set>
+                                      <p:cBhvr>
+                                        <p:cTn id="6" dur="1" fill="hold">
+                                          <p:stCondLst>
+                                            <p:cond delay="0"/>
+                                          </p:stCondLst>
+                                        </p:cTn>
+                                        <p:tgtEl>
+                                          <p:spTgt spid="5">
+                                            <p:txEl>
+                                              <p:pRg st="0" end="0"/>
+                                            </p:txEl>
+                                          </p:spTgt>
+                                        </p:tgtEl>
+                                        <p:attrNameLst>
+                                          <p:attrName>style.visibility</p:attrName>
+                                        </p:attrNameLst>
+                                      </p:cBhvr>
+                                      <p:to>
+                                        <p:strVal val="visible"/>
+                                      </p:to>
+                                    </p:set>
+                                    <p:animEffect transition="in" filter="fade">
+                                      <p:cBhvr>
+                                        <p:cTn id="7" dur="500"/>
+                                        <p:tgtEl>
+                                          <p:spTgt spid="5">
+                                            <p:txEl>
+                                              <p:pRg st="0" end="0"/>
+                                            </p:txEl>
+                                          </p:spTgt>
+                                        </p:tgtEl>
+                                      </p:cBhvr>
+                                    </p:animEffect>
+                                  </p:childTnLst>
+                                </p:cTn>
+                              </p:par>
+                            </p:childTnLst>
+                          </p:cTn>
+                        </p:par>
+                      </p:childTnLst>
+                    </p:cTn>
+                  </p:par>
+                  <p:par>
+                    <p:cTn id="8" fill="hold">
+                      <p:stCondLst>
+                        <p:cond delay="indefinite"/>
+                      </p:stCondLst>
+                      <p:childTnLst>
+                        <p:par>
+                          <p:cTn id="9" fill="hold">
+                            <p:stCondLst>
+                              <p:cond delay="0"/>
+                            </p:stCondLst>
+                            <p:childTnLst>
+                              <p:par>
+                                <p:cTn id="10" presetID="10" presetClass="entr" presetSubtype="0" fill="hold" grpId="0" nodeType="clickEffect">
+                                  <p:stCondLst>
+                                    <p:cond delay="0"/>
+                                  </p:stCondLst>
+                                  <p:childTnLst>
+                                    <p:set>
+                                      <p:cBhvr>
+                                        <p:cTn id="11" dur="1" fill="hold">
+                                          <p:stCondLst>
+                                            <p:cond delay="0"/>
+                                          </p:stCondLst>
+                                        </p:cTn>
+                                        <p:tgtEl>
+                                          <p:spTgt spid="5">
+                                            <p:txEl>
+                                              <p:pRg st="1" end="1"/>
+                                            </p:txEl>
+                                          </p:spTgt>
+                                        </p:tgtEl>
+                                        <p:attrNameLst>
+                                          <p:attrName>style.visibility</p:attrName>
+                                        </p:attrNameLst>
+                                      </p:cBhvr>
+                                      <p:to>
+                                        <p:strVal val="visible"/>
+                                      </p:to>
+                                    </p:set>
+                                    <p:animEffect transition="in" filter="fade">
+                                      <p:cBhvr>
+                                        <p:cTn id="12" dur="500"/>
+                                        <p:tgtEl>
+                                          <p:spTgt spid="5">
+                                            <p:txEl>
+                                              <p:pRg st="1" end="1"/>
+                                            </p:txEl>
+                                          </p:spTgt>
+                                        </p:tgtEl>
+                                      </p:cBhvr>
+                                    </p:animEffect>
+                                  </p:childTnLst>
+                                </p:cTn>
+                              </p:par>
+                            </p:childTnLst>
+                          </p:cTn>
+                        </p:par>
+                      </p:childTnLst>
+                    </p:cTn>
+                  </p:par>
+                </p:childTnLst>
+              </p:cTn>
+              <p:prevCondLst>
+                <p:cond evt="onPrev" delay="0">
+                  <p:tgtEl>
+                    <p:sldTgt/>
+                  </p:tgtEl>
+                </p:cond>
+              </p:prevCondLst>
+              <p:nextCondLst>
+                <p:cond evt="onNext" delay="0">
+                  <p:tgtEl>
+                    <p:sldTgt/>
+                  </p:tgtEl>
+                </p:cond>
+              </p:nextCondLst>
+            </p:seq>
+          </p:childTnLst>
+        </p:cTn>
+      </p:par>
+    </p:tnLst>
+    <p:bldLst>
+      <p:bldP spid="5" grpId="0" uiExpand="1" build="p"/>
+    </p:bldLst>
+  </p:timing>
 </p:sld>
 </file>
 
@@ -29158,7 +30150,624 @@
                             </p:stCondLst>
                             <p:childTnLst>
                               <p:par>
-                                <p:cTn id="5" presetID="10" presetClass="entr" presetSubtype="0" fill="hold" grpId="0" nodeType="withEffect">
+                                <p:cTn id="5" presetID="10" presetClass="entr" presetSubtype="0" fill="hold" grpId="0" nodeType="afterEffect">
+                                  <p:stCondLst>
+                                    <p:cond delay="0"/>
+                                  </p:stCondLst>
+                                  <p:childTnLst>
+                                    <p:set>
+                                      <p:cBhvr>
+                                        <p:cTn id="6" dur="1" fill="hold">
+                                          <p:stCondLst>
+                                            <p:cond delay="0"/>
+                                          </p:stCondLst>
+                                        </p:cTn>
+                                        <p:tgtEl>
+                                          <p:spTgt spid="7">
+                                            <p:txEl>
+                                              <p:pRg st="0" end="0"/>
+                                            </p:txEl>
+                                          </p:spTgt>
+                                        </p:tgtEl>
+                                        <p:attrNameLst>
+                                          <p:attrName>style.visibility</p:attrName>
+                                        </p:attrNameLst>
+                                      </p:cBhvr>
+                                      <p:to>
+                                        <p:strVal val="visible"/>
+                                      </p:to>
+                                    </p:set>
+                                    <p:animEffect transition="in" filter="fade">
+                                      <p:cBhvr>
+                                        <p:cTn id="7" dur="500"/>
+                                        <p:tgtEl>
+                                          <p:spTgt spid="7">
+                                            <p:txEl>
+                                              <p:pRg st="0" end="0"/>
+                                            </p:txEl>
+                                          </p:spTgt>
+                                        </p:tgtEl>
+                                      </p:cBhvr>
+                                    </p:animEffect>
+                                  </p:childTnLst>
+                                </p:cTn>
+                              </p:par>
+                              <p:par>
+                                <p:cTn id="8" presetID="10" presetClass="entr" presetSubtype="0" fill="hold" nodeType="withEffect">
+                                  <p:stCondLst>
+                                    <p:cond delay="0"/>
+                                  </p:stCondLst>
+                                  <p:childTnLst>
+                                    <p:set>
+                                      <p:cBhvr>
+                                        <p:cTn id="9" dur="1" fill="hold">
+                                          <p:stCondLst>
+                                            <p:cond delay="0"/>
+                                          </p:stCondLst>
+                                        </p:cTn>
+                                        <p:tgtEl>
+                                          <p:spTgt spid="6"/>
+                                        </p:tgtEl>
+                                        <p:attrNameLst>
+                                          <p:attrName>style.visibility</p:attrName>
+                                        </p:attrNameLst>
+                                      </p:cBhvr>
+                                      <p:to>
+                                        <p:strVal val="visible"/>
+                                      </p:to>
+                                    </p:set>
+                                    <p:animEffect transition="in" filter="fade">
+                                      <p:cBhvr>
+                                        <p:cTn id="10" dur="500"/>
+                                        <p:tgtEl>
+                                          <p:spTgt spid="6"/>
+                                        </p:tgtEl>
+                                      </p:cBhvr>
+                                    </p:animEffect>
+                                  </p:childTnLst>
+                                </p:cTn>
+                              </p:par>
+                              <p:par>
+                                <p:cTn id="11" presetID="10" presetClass="entr" presetSubtype="0" fill="hold" grpId="0" nodeType="withEffect">
+                                  <p:stCondLst>
+                                    <p:cond delay="0"/>
+                                  </p:stCondLst>
+                                  <p:childTnLst>
+                                    <p:set>
+                                      <p:cBhvr>
+                                        <p:cTn id="12" dur="1" fill="hold">
+                                          <p:stCondLst>
+                                            <p:cond delay="0"/>
+                                          </p:stCondLst>
+                                        </p:cTn>
+                                        <p:tgtEl>
+                                          <p:spTgt spid="4">
+                                            <p:txEl>
+                                              <p:pRg st="0" end="0"/>
+                                            </p:txEl>
+                                          </p:spTgt>
+                                        </p:tgtEl>
+                                        <p:attrNameLst>
+                                          <p:attrName>style.visibility</p:attrName>
+                                        </p:attrNameLst>
+                                      </p:cBhvr>
+                                      <p:to>
+                                        <p:strVal val="visible"/>
+                                      </p:to>
+                                    </p:set>
+                                    <p:animEffect transition="in" filter="fade">
+                                      <p:cBhvr>
+                                        <p:cTn id="13" dur="500"/>
+                                        <p:tgtEl>
+                                          <p:spTgt spid="4">
+                                            <p:txEl>
+                                              <p:pRg st="0" end="0"/>
+                                            </p:txEl>
+                                          </p:spTgt>
+                                        </p:tgtEl>
+                                      </p:cBhvr>
+                                    </p:animEffect>
+                                  </p:childTnLst>
+                                </p:cTn>
+                              </p:par>
+                            </p:childTnLst>
+                          </p:cTn>
+                        </p:par>
+                      </p:childTnLst>
+                    </p:cTn>
+                  </p:par>
+                </p:childTnLst>
+              </p:cTn>
+              <p:prevCondLst>
+                <p:cond evt="onPrev" delay="0">
+                  <p:tgtEl>
+                    <p:sldTgt/>
+                  </p:tgtEl>
+                </p:cond>
+              </p:prevCondLst>
+              <p:nextCondLst>
+                <p:cond evt="onNext" delay="0">
+                  <p:tgtEl>
+                    <p:sldTgt/>
+                  </p:tgtEl>
+                </p:cond>
+              </p:nextCondLst>
+            </p:seq>
+          </p:childTnLst>
+        </p:cTn>
+      </p:par>
+    </p:tnLst>
+    <p:bldLst>
+      <p:bldP spid="4" grpId="0" build="p"/>
+      <p:bldP spid="7" grpId="0" build="p"/>
+    </p:bldLst>
+  </p:timing>
+</p:sld>
+</file>
+
+<file path=ppt/slides/slide60.xml><?xml version="1.0" encoding="utf-8"?>
+<p:sld xmlns:a="http://schemas.openxmlformats.org/drawingml/2006/main" xmlns:r="http://schemas.openxmlformats.org/officeDocument/2006/relationships" xmlns:p="http://schemas.openxmlformats.org/presentationml/2006/main">
+  <p:cSld>
+    <p:spTree>
+      <p:nvGrpSpPr>
+        <p:cNvPr id="1" name=""/>
+        <p:cNvGrpSpPr/>
+        <p:nvPr/>
+      </p:nvGrpSpPr>
+      <p:grpSpPr>
+        <a:xfrm>
+          <a:off x="0" y="0"/>
+          <a:ext cx="0" cy="0"/>
+          <a:chOff x="0" y="0"/>
+          <a:chExt cx="0" cy="0"/>
+        </a:xfrm>
+      </p:grpSpPr>
+      <p:sp>
+        <p:nvSpPr>
+          <p:cNvPr id="2" name="Title 1"/>
+          <p:cNvSpPr>
+            <a:spLocks noGrp="1"/>
+          </p:cNvSpPr>
+          <p:nvPr>
+            <p:ph type="title"/>
+          </p:nvPr>
+        </p:nvSpPr>
+        <p:spPr/>
+        <p:txBody>
+          <a:bodyPr/>
+          <a:lstStyle/>
+          <a:p>
+            <a:r>
+              <a:rPr lang="en-US" dirty="0" smtClean="0"/>
+              <a:t>Continuous </a:t>
+            </a:r>
+            <a:r>
+              <a:rPr lang="en-US" dirty="0" err="1" smtClean="0"/>
+              <a:t>INtegration</a:t>
+            </a:r>
+            <a:endParaRPr lang="en-US" dirty="0"/>
+          </a:p>
+        </p:txBody>
+      </p:sp>
+      <p:sp>
+        <p:nvSpPr>
+          <p:cNvPr id="3" name="Text Placeholder 2"/>
+          <p:cNvSpPr>
+            <a:spLocks noGrp="1"/>
+          </p:cNvSpPr>
+          <p:nvPr>
+            <p:ph type="body" idx="1"/>
+          </p:nvPr>
+        </p:nvSpPr>
+        <p:spPr/>
+        <p:txBody>
+          <a:bodyPr/>
+          <a:lstStyle/>
+          <a:p>
+            <a:endParaRPr lang="en-US"/>
+          </a:p>
+        </p:txBody>
+      </p:sp>
+    </p:spTree>
+    <p:extLst>
+      <p:ext uri="{BB962C8B-B14F-4D97-AF65-F5344CB8AC3E}">
+        <p14:creationId xmlns:p14="http://schemas.microsoft.com/office/powerpoint/2010/main" val="2532491663"/>
+      </p:ext>
+    </p:extLst>
+  </p:cSld>
+  <p:clrMapOvr>
+    <a:masterClrMapping/>
+  </p:clrMapOvr>
+  <p:timing>
+    <p:tnLst>
+      <p:par>
+        <p:cTn id="1" dur="indefinite" restart="never" nodeType="tmRoot"/>
+      </p:par>
+    </p:tnLst>
+  </p:timing>
+</p:sld>
+</file>
+
+<file path=ppt/slides/slide61.xml><?xml version="1.0" encoding="utf-8"?>
+<p:sld xmlns:a="http://schemas.openxmlformats.org/drawingml/2006/main" xmlns:r="http://schemas.openxmlformats.org/officeDocument/2006/relationships" xmlns:p="http://schemas.openxmlformats.org/presentationml/2006/main">
+  <p:cSld>
+    <p:spTree>
+      <p:nvGrpSpPr>
+        <p:cNvPr id="1" name=""/>
+        <p:cNvGrpSpPr/>
+        <p:nvPr/>
+      </p:nvGrpSpPr>
+      <p:grpSpPr>
+        <a:xfrm>
+          <a:off x="0" y="0"/>
+          <a:ext cx="0" cy="0"/>
+          <a:chOff x="0" y="0"/>
+          <a:chExt cx="0" cy="0"/>
+        </a:xfrm>
+      </p:grpSpPr>
+      <p:sp>
+        <p:nvSpPr>
+          <p:cNvPr id="4" name="Title 3"/>
+          <p:cNvSpPr>
+            <a:spLocks noGrp="1"/>
+          </p:cNvSpPr>
+          <p:nvPr>
+            <p:ph type="title"/>
+          </p:nvPr>
+        </p:nvSpPr>
+        <p:spPr/>
+        <p:txBody>
+          <a:bodyPr/>
+          <a:lstStyle/>
+          <a:p>
+            <a:r>
+              <a:rPr lang="en-US" dirty="0" smtClean="0"/>
+              <a:t>Continuous Integration</a:t>
+            </a:r>
+            <a:endParaRPr lang="en-US" dirty="0"/>
+          </a:p>
+        </p:txBody>
+      </p:sp>
+      <p:sp>
+        <p:nvSpPr>
+          <p:cNvPr id="5" name="Content Placeholder 4"/>
+          <p:cNvSpPr>
+            <a:spLocks noGrp="1"/>
+          </p:cNvSpPr>
+          <p:nvPr>
+            <p:ph idx="1"/>
+          </p:nvPr>
+        </p:nvSpPr>
+        <p:spPr/>
+        <p:txBody>
+          <a:bodyPr/>
+          <a:lstStyle/>
+          <a:p>
+            <a:r>
+              <a:rPr lang="en-US" dirty="0" smtClean="0"/>
+              <a:t>Build server needs UWP dev tools installed</a:t>
+            </a:r>
+            <a:endParaRPr lang="en-US" dirty="0"/>
+          </a:p>
+        </p:txBody>
+      </p:sp>
+    </p:spTree>
+    <p:extLst>
+      <p:ext uri="{BB962C8B-B14F-4D97-AF65-F5344CB8AC3E}">
+        <p14:creationId xmlns:p14="http://schemas.microsoft.com/office/powerpoint/2010/main" val="3044483887"/>
+      </p:ext>
+    </p:extLst>
+  </p:cSld>
+  <p:clrMapOvr>
+    <a:masterClrMapping/>
+  </p:clrMapOvr>
+  <p:timing>
+    <p:tnLst>
+      <p:par>
+        <p:cTn id="1" dur="indefinite" restart="never" nodeType="tmRoot">
+          <p:childTnLst>
+            <p:seq concurrent="1" nextAc="seek">
+              <p:cTn id="2" dur="indefinite" nodeType="mainSeq">
+                <p:childTnLst>
+                  <p:par>
+                    <p:cTn id="3" fill="hold">
+                      <p:stCondLst>
+                        <p:cond delay="indefinite"/>
+                        <p:cond evt="onBegin" delay="0">
+                          <p:tn val="2"/>
+                        </p:cond>
+                      </p:stCondLst>
+                      <p:childTnLst>
+                        <p:par>
+                          <p:cTn id="4" fill="hold">
+                            <p:stCondLst>
+                              <p:cond delay="0"/>
+                            </p:stCondLst>
+                            <p:childTnLst>
+                              <p:par>
+                                <p:cTn id="5" presetID="10" presetClass="entr" presetSubtype="0" fill="hold" grpId="0" nodeType="afterEffect">
+                                  <p:stCondLst>
+                                    <p:cond delay="0"/>
+                                  </p:stCondLst>
+                                  <p:childTnLst>
+                                    <p:set>
+                                      <p:cBhvr>
+                                        <p:cTn id="6" dur="1" fill="hold">
+                                          <p:stCondLst>
+                                            <p:cond delay="0"/>
+                                          </p:stCondLst>
+                                        </p:cTn>
+                                        <p:tgtEl>
+                                          <p:spTgt spid="5">
+                                            <p:txEl>
+                                              <p:pRg st="0" end="0"/>
+                                            </p:txEl>
+                                          </p:spTgt>
+                                        </p:tgtEl>
+                                        <p:attrNameLst>
+                                          <p:attrName>style.visibility</p:attrName>
+                                        </p:attrNameLst>
+                                      </p:cBhvr>
+                                      <p:to>
+                                        <p:strVal val="visible"/>
+                                      </p:to>
+                                    </p:set>
+                                    <p:animEffect transition="in" filter="fade">
+                                      <p:cBhvr>
+                                        <p:cTn id="7" dur="500"/>
+                                        <p:tgtEl>
+                                          <p:spTgt spid="5">
+                                            <p:txEl>
+                                              <p:pRg st="0" end="0"/>
+                                            </p:txEl>
+                                          </p:spTgt>
+                                        </p:tgtEl>
+                                      </p:cBhvr>
+                                    </p:animEffect>
+                                  </p:childTnLst>
+                                </p:cTn>
+                              </p:par>
+                            </p:childTnLst>
+                          </p:cTn>
+                        </p:par>
+                      </p:childTnLst>
+                    </p:cTn>
+                  </p:par>
+                </p:childTnLst>
+              </p:cTn>
+              <p:prevCondLst>
+                <p:cond evt="onPrev" delay="0">
+                  <p:tgtEl>
+                    <p:sldTgt/>
+                  </p:tgtEl>
+                </p:cond>
+              </p:prevCondLst>
+              <p:nextCondLst>
+                <p:cond evt="onNext" delay="0">
+                  <p:tgtEl>
+                    <p:sldTgt/>
+                  </p:tgtEl>
+                </p:cond>
+              </p:nextCondLst>
+            </p:seq>
+          </p:childTnLst>
+        </p:cTn>
+      </p:par>
+    </p:tnLst>
+    <p:bldLst>
+      <p:bldP spid="5" grpId="0" build="p"/>
+    </p:bldLst>
+  </p:timing>
+</p:sld>
+</file>
+
+<file path=ppt/slides/slide62.xml><?xml version="1.0" encoding="utf-8"?>
+<p:sld xmlns:a="http://schemas.openxmlformats.org/drawingml/2006/main" xmlns:r="http://schemas.openxmlformats.org/officeDocument/2006/relationships" xmlns:p="http://schemas.openxmlformats.org/presentationml/2006/main">
+  <p:cSld>
+    <p:spTree>
+      <p:nvGrpSpPr>
+        <p:cNvPr id="1" name=""/>
+        <p:cNvGrpSpPr/>
+        <p:nvPr/>
+      </p:nvGrpSpPr>
+      <p:grpSpPr>
+        <a:xfrm>
+          <a:off x="0" y="0"/>
+          <a:ext cx="0" cy="0"/>
+          <a:chOff x="0" y="0"/>
+          <a:chExt cx="0" cy="0"/>
+        </a:xfrm>
+      </p:grpSpPr>
+      <p:sp>
+        <p:nvSpPr>
+          <p:cNvPr id="4" name="Title 3"/>
+          <p:cNvSpPr>
+            <a:spLocks noGrp="1"/>
+          </p:cNvSpPr>
+          <p:nvPr>
+            <p:ph type="title"/>
+          </p:nvPr>
+        </p:nvSpPr>
+        <p:spPr/>
+        <p:txBody>
+          <a:bodyPr/>
+          <a:lstStyle/>
+          <a:p>
+            <a:r>
+              <a:rPr lang="en-US" dirty="0" smtClean="0"/>
+              <a:t>deployment</a:t>
+            </a:r>
+            <a:endParaRPr lang="en-US" dirty="0"/>
+          </a:p>
+        </p:txBody>
+      </p:sp>
+      <p:sp>
+        <p:nvSpPr>
+          <p:cNvPr id="5" name="Text Placeholder 4"/>
+          <p:cNvSpPr>
+            <a:spLocks noGrp="1"/>
+          </p:cNvSpPr>
+          <p:nvPr>
+            <p:ph type="body" idx="1"/>
+          </p:nvPr>
+        </p:nvSpPr>
+        <p:spPr/>
+        <p:txBody>
+          <a:bodyPr/>
+          <a:lstStyle/>
+          <a:p>
+            <a:endParaRPr lang="en-US"/>
+          </a:p>
+        </p:txBody>
+      </p:sp>
+    </p:spTree>
+    <p:extLst>
+      <p:ext uri="{BB962C8B-B14F-4D97-AF65-F5344CB8AC3E}">
+        <p14:creationId xmlns:p14="http://schemas.microsoft.com/office/powerpoint/2010/main" val="1343757648"/>
+      </p:ext>
+    </p:extLst>
+  </p:cSld>
+  <p:clrMapOvr>
+    <a:masterClrMapping/>
+  </p:clrMapOvr>
+  <p:timing>
+    <p:tnLst>
+      <p:par>
+        <p:cTn id="1" dur="indefinite" restart="never" nodeType="tmRoot"/>
+      </p:par>
+    </p:tnLst>
+  </p:timing>
+</p:sld>
+</file>
+
+<file path=ppt/slides/slide63.xml><?xml version="1.0" encoding="utf-8"?>
+<p:sld xmlns:a="http://schemas.openxmlformats.org/drawingml/2006/main" xmlns:r="http://schemas.openxmlformats.org/officeDocument/2006/relationships" xmlns:p="http://schemas.openxmlformats.org/presentationml/2006/main">
+  <p:cSld>
+    <p:spTree>
+      <p:nvGrpSpPr>
+        <p:cNvPr id="1" name=""/>
+        <p:cNvGrpSpPr/>
+        <p:nvPr/>
+      </p:nvGrpSpPr>
+      <p:grpSpPr>
+        <a:xfrm>
+          <a:off x="0" y="0"/>
+          <a:ext cx="0" cy="0"/>
+          <a:chOff x="0" y="0"/>
+          <a:chExt cx="0" cy="0"/>
+        </a:xfrm>
+      </p:grpSpPr>
+      <p:sp>
+        <p:nvSpPr>
+          <p:cNvPr id="6" name="Title 5"/>
+          <p:cNvSpPr>
+            <a:spLocks noGrp="1"/>
+          </p:cNvSpPr>
+          <p:nvPr>
+            <p:ph type="title"/>
+          </p:nvPr>
+        </p:nvSpPr>
+        <p:spPr/>
+        <p:txBody>
+          <a:bodyPr/>
+          <a:lstStyle/>
+          <a:p>
+            <a:r>
+              <a:rPr lang="en-US" dirty="0" smtClean="0"/>
+              <a:t>Deployment</a:t>
+            </a:r>
+            <a:endParaRPr lang="en-US" dirty="0"/>
+          </a:p>
+        </p:txBody>
+      </p:sp>
+      <p:sp>
+        <p:nvSpPr>
+          <p:cNvPr id="7" name="Content Placeholder 6"/>
+          <p:cNvSpPr>
+            <a:spLocks noGrp="1"/>
+          </p:cNvSpPr>
+          <p:nvPr>
+            <p:ph idx="1"/>
+          </p:nvPr>
+        </p:nvSpPr>
+        <p:spPr/>
+        <p:txBody>
+          <a:bodyPr/>
+          <a:lstStyle/>
+          <a:p>
+            <a:r>
+              <a:rPr lang="en-US" dirty="0" smtClean="0"/>
+              <a:t>Can be done with Visual Studio</a:t>
+            </a:r>
+          </a:p>
+          <a:p>
+            <a:pPr lvl="1"/>
+            <a:r>
+              <a:rPr lang="en-US" dirty="0" smtClean="0"/>
+              <a:t>Don’t forget to add all assets for icons, etc.</a:t>
+            </a:r>
+          </a:p>
+          <a:p>
+            <a:r>
+              <a:rPr lang="en-US" dirty="0" smtClean="0"/>
+              <a:t>Create App Packages</a:t>
+            </a:r>
+          </a:p>
+          <a:p>
+            <a:pPr lvl="1"/>
+            <a:r>
+              <a:rPr lang="en-US" dirty="0" smtClean="0"/>
+              <a:t>Choose App Name</a:t>
+            </a:r>
+          </a:p>
+          <a:p>
+            <a:pPr lvl="1"/>
+            <a:r>
+              <a:rPr lang="en-US" dirty="0" smtClean="0"/>
+              <a:t>Choose Configurations</a:t>
+            </a:r>
+          </a:p>
+          <a:p>
+            <a:pPr lvl="1"/>
+            <a:r>
+              <a:rPr lang="en-US" dirty="0" smtClean="0"/>
+              <a:t>Test with local Windows App Certification Kit</a:t>
+            </a:r>
+          </a:p>
+        </p:txBody>
+      </p:sp>
+    </p:spTree>
+    <p:extLst>
+      <p:ext uri="{BB962C8B-B14F-4D97-AF65-F5344CB8AC3E}">
+        <p14:creationId xmlns:p14="http://schemas.microsoft.com/office/powerpoint/2010/main" val="3977619623"/>
+      </p:ext>
+    </p:extLst>
+  </p:cSld>
+  <p:clrMapOvr>
+    <a:masterClrMapping/>
+  </p:clrMapOvr>
+  <p:timing>
+    <p:tnLst>
+      <p:par>
+        <p:cTn id="1" dur="indefinite" restart="never" nodeType="tmRoot">
+          <p:childTnLst>
+            <p:seq concurrent="1" nextAc="seek">
+              <p:cTn id="2" dur="indefinite" nodeType="mainSeq">
+                <p:childTnLst>
+                  <p:par>
+                    <p:cTn id="3" fill="hold">
+                      <p:stCondLst>
+                        <p:cond delay="indefinite"/>
+                      </p:stCondLst>
+                      <p:childTnLst>
+                        <p:par>
+                          <p:cTn id="4" fill="hold">
+                            <p:stCondLst>
+                              <p:cond delay="0"/>
+                            </p:stCondLst>
+                            <p:childTnLst>
+                              <p:par>
+                                <p:cTn id="5" presetID="10" presetClass="entr" presetSubtype="0" fill="hold" grpId="0" nodeType="clickEffect">
                                   <p:stCondLst>
                                     <p:cond delay="0"/>
                                   </p:stCondLst>
@@ -29203,6 +30812,275 @@
                             </p:childTnLst>
                           </p:cTn>
                         </p:par>
+                        <p:par>
+                          <p:cTn id="8" fill="hold">
+                            <p:stCondLst>
+                              <p:cond delay="500"/>
+                            </p:stCondLst>
+                            <p:childTnLst>
+                              <p:par>
+                                <p:cTn id="9" presetID="10" presetClass="entr" presetSubtype="0" fill="hold" grpId="0" nodeType="afterEffect">
+                                  <p:stCondLst>
+                                    <p:cond delay="0"/>
+                                  </p:stCondLst>
+                                  <p:childTnLst>
+                                    <p:set>
+                                      <p:cBhvr>
+                                        <p:cTn id="10" dur="1" fill="hold">
+                                          <p:stCondLst>
+                                            <p:cond delay="0"/>
+                                          </p:stCondLst>
+                                        </p:cTn>
+                                        <p:tgtEl>
+                                          <p:spTgt spid="7">
+                                            <p:txEl>
+                                              <p:pRg st="1" end="1"/>
+                                            </p:txEl>
+                                          </p:spTgt>
+                                        </p:tgtEl>
+                                        <p:attrNameLst>
+                                          <p:attrName>style.visibility</p:attrName>
+                                        </p:attrNameLst>
+                                      </p:cBhvr>
+                                      <p:to>
+                                        <p:strVal val="visible"/>
+                                      </p:to>
+                                    </p:set>
+                                    <p:animEffect transition="in" filter="fade">
+                                      <p:cBhvr>
+                                        <p:cTn id="11" dur="500"/>
+                                        <p:tgtEl>
+                                          <p:spTgt spid="7">
+                                            <p:txEl>
+                                              <p:pRg st="1" end="1"/>
+                                            </p:txEl>
+                                          </p:spTgt>
+                                        </p:tgtEl>
+                                      </p:cBhvr>
+                                    </p:animEffect>
+                                  </p:childTnLst>
+                                </p:cTn>
+                              </p:par>
+                            </p:childTnLst>
+                          </p:cTn>
+                        </p:par>
+                      </p:childTnLst>
+                    </p:cTn>
+                  </p:par>
+                  <p:par>
+                    <p:cTn id="12" fill="hold">
+                      <p:stCondLst>
+                        <p:cond delay="indefinite"/>
+                      </p:stCondLst>
+                      <p:childTnLst>
+                        <p:par>
+                          <p:cTn id="13" fill="hold">
+                            <p:stCondLst>
+                              <p:cond delay="0"/>
+                            </p:stCondLst>
+                            <p:childTnLst>
+                              <p:par>
+                                <p:cTn id="14" presetID="10" presetClass="entr" presetSubtype="0" fill="hold" grpId="0" nodeType="clickEffect">
+                                  <p:stCondLst>
+                                    <p:cond delay="0"/>
+                                  </p:stCondLst>
+                                  <p:childTnLst>
+                                    <p:set>
+                                      <p:cBhvr>
+                                        <p:cTn id="15" dur="1" fill="hold">
+                                          <p:stCondLst>
+                                            <p:cond delay="0"/>
+                                          </p:stCondLst>
+                                        </p:cTn>
+                                        <p:tgtEl>
+                                          <p:spTgt spid="7">
+                                            <p:txEl>
+                                              <p:pRg st="2" end="2"/>
+                                            </p:txEl>
+                                          </p:spTgt>
+                                        </p:tgtEl>
+                                        <p:attrNameLst>
+                                          <p:attrName>style.visibility</p:attrName>
+                                        </p:attrNameLst>
+                                      </p:cBhvr>
+                                      <p:to>
+                                        <p:strVal val="visible"/>
+                                      </p:to>
+                                    </p:set>
+                                    <p:animEffect transition="in" filter="fade">
+                                      <p:cBhvr>
+                                        <p:cTn id="16" dur="500"/>
+                                        <p:tgtEl>
+                                          <p:spTgt spid="7">
+                                            <p:txEl>
+                                              <p:pRg st="2" end="2"/>
+                                            </p:txEl>
+                                          </p:spTgt>
+                                        </p:tgtEl>
+                                      </p:cBhvr>
+                                    </p:animEffect>
+                                  </p:childTnLst>
+                                </p:cTn>
+                              </p:par>
+                            </p:childTnLst>
+                          </p:cTn>
+                        </p:par>
+                        <p:par>
+                          <p:cTn id="17" fill="hold">
+                            <p:stCondLst>
+                              <p:cond delay="500"/>
+                            </p:stCondLst>
+                            <p:childTnLst>
+                              <p:par>
+                                <p:cTn id="18" presetID="10" presetClass="entr" presetSubtype="0" fill="hold" grpId="0" nodeType="afterEffect">
+                                  <p:stCondLst>
+                                    <p:cond delay="0"/>
+                                  </p:stCondLst>
+                                  <p:childTnLst>
+                                    <p:set>
+                                      <p:cBhvr>
+                                        <p:cTn id="19" dur="1" fill="hold">
+                                          <p:stCondLst>
+                                            <p:cond delay="0"/>
+                                          </p:stCondLst>
+                                        </p:cTn>
+                                        <p:tgtEl>
+                                          <p:spTgt spid="7">
+                                            <p:txEl>
+                                              <p:pRg st="3" end="3"/>
+                                            </p:txEl>
+                                          </p:spTgt>
+                                        </p:tgtEl>
+                                        <p:attrNameLst>
+                                          <p:attrName>style.visibility</p:attrName>
+                                        </p:attrNameLst>
+                                      </p:cBhvr>
+                                      <p:to>
+                                        <p:strVal val="visible"/>
+                                      </p:to>
+                                    </p:set>
+                                    <p:animEffect transition="in" filter="fade">
+                                      <p:cBhvr>
+                                        <p:cTn id="20" dur="500"/>
+                                        <p:tgtEl>
+                                          <p:spTgt spid="7">
+                                            <p:txEl>
+                                              <p:pRg st="3" end="3"/>
+                                            </p:txEl>
+                                          </p:spTgt>
+                                        </p:tgtEl>
+                                      </p:cBhvr>
+                                    </p:animEffect>
+                                  </p:childTnLst>
+                                </p:cTn>
+                              </p:par>
+                            </p:childTnLst>
+                          </p:cTn>
+                        </p:par>
+                        <p:par>
+                          <p:cTn id="21" fill="hold">
+                            <p:stCondLst>
+                              <p:cond delay="1000"/>
+                            </p:stCondLst>
+                            <p:childTnLst>
+                              <p:par>
+                                <p:cTn id="22" presetID="10" presetClass="entr" presetSubtype="0" fill="hold" grpId="0" nodeType="afterEffect">
+                                  <p:stCondLst>
+                                    <p:cond delay="0"/>
+                                  </p:stCondLst>
+                                  <p:childTnLst>
+                                    <p:set>
+                                      <p:cBhvr>
+                                        <p:cTn id="23" dur="1" fill="hold">
+                                          <p:stCondLst>
+                                            <p:cond delay="0"/>
+                                          </p:stCondLst>
+                                        </p:cTn>
+                                        <p:tgtEl>
+                                          <p:spTgt spid="7">
+                                            <p:txEl>
+                                              <p:pRg st="4" end="4"/>
+                                            </p:txEl>
+                                          </p:spTgt>
+                                        </p:tgtEl>
+                                        <p:attrNameLst>
+                                          <p:attrName>style.visibility</p:attrName>
+                                        </p:attrNameLst>
+                                      </p:cBhvr>
+                                      <p:to>
+                                        <p:strVal val="visible"/>
+                                      </p:to>
+                                    </p:set>
+                                    <p:animEffect transition="in" filter="fade">
+                                      <p:cBhvr>
+                                        <p:cTn id="24" dur="500"/>
+                                        <p:tgtEl>
+                                          <p:spTgt spid="7">
+                                            <p:txEl>
+                                              <p:pRg st="4" end="4"/>
+                                            </p:txEl>
+                                          </p:spTgt>
+                                        </p:tgtEl>
+                                      </p:cBhvr>
+                                    </p:animEffect>
+                                  </p:childTnLst>
+                                </p:cTn>
+                              </p:par>
+                            </p:childTnLst>
+                          </p:cTn>
+                        </p:par>
+                        <p:par>
+                          <p:cTn id="25" fill="hold">
+                            <p:stCondLst>
+                              <p:cond delay="1500"/>
+                            </p:stCondLst>
+                            <p:childTnLst>
+                              <p:par>
+                                <p:cTn id="26" presetID="10" presetClass="entr" presetSubtype="0" fill="hold" grpId="0" nodeType="afterEffect">
+                                  <p:stCondLst>
+                                    <p:cond delay="0"/>
+                                  </p:stCondLst>
+                                  <p:childTnLst>
+                                    <p:set>
+                                      <p:cBhvr>
+                                        <p:cTn id="27" dur="1" fill="hold">
+                                          <p:stCondLst>
+                                            <p:cond delay="0"/>
+                                          </p:stCondLst>
+                                        </p:cTn>
+                                        <p:tgtEl>
+                                          <p:spTgt spid="7">
+                                            <p:txEl>
+                                              <p:pRg st="5" end="5"/>
+                                            </p:txEl>
+                                          </p:spTgt>
+                                        </p:tgtEl>
+                                        <p:attrNameLst>
+                                          <p:attrName>style.visibility</p:attrName>
+                                        </p:attrNameLst>
+                                      </p:cBhvr>
+                                      <p:to>
+                                        <p:strVal val="visible"/>
+                                      </p:to>
+                                    </p:set>
+                                    <p:animEffect transition="in" filter="fade">
+                                      <p:cBhvr>
+                                        <p:cTn id="28" dur="500"/>
+                                        <p:tgtEl>
+                                          <p:spTgt spid="7">
+                                            <p:txEl>
+                                              <p:pRg st="5" end="5"/>
+                                            </p:txEl>
+                                          </p:spTgt>
+                                        </p:tgtEl>
+                                      </p:cBhvr>
+                                    </p:animEffect>
+                                  </p:childTnLst>
+                                </p:cTn>
+                              </p:par>
+                            </p:childTnLst>
+                          </p:cTn>
+                        </p:par>
                       </p:childTnLst>
                     </p:cTn>
                   </p:par>
@@ -29228,342 +31106,9 @@
       </p:par>
     </p:tnLst>
     <p:bldLst>
-      <p:bldP spid="7" grpId="0" build="p"/>
+      <p:bldP spid="7" grpId="0" uiExpand="1" build="p"/>
     </p:bldLst>
   </p:timing>
-</p:sld>
-</file>
-
-<file path=ppt/slides/slide60.xml><?xml version="1.0" encoding="utf-8"?>
-<p:sld xmlns:a="http://schemas.openxmlformats.org/drawingml/2006/main" xmlns:r="http://schemas.openxmlformats.org/officeDocument/2006/relationships" xmlns:p="http://schemas.openxmlformats.org/presentationml/2006/main">
-  <p:cSld>
-    <p:spTree>
-      <p:nvGrpSpPr>
-        <p:cNvPr id="1" name=""/>
-        <p:cNvGrpSpPr/>
-        <p:nvPr/>
-      </p:nvGrpSpPr>
-      <p:grpSpPr>
-        <a:xfrm>
-          <a:off x="0" y="0"/>
-          <a:ext cx="0" cy="0"/>
-          <a:chOff x="0" y="0"/>
-          <a:chExt cx="0" cy="0"/>
-        </a:xfrm>
-      </p:grpSpPr>
-      <p:sp>
-        <p:nvSpPr>
-          <p:cNvPr id="2" name="Title 1"/>
-          <p:cNvSpPr>
-            <a:spLocks noGrp="1"/>
-          </p:cNvSpPr>
-          <p:nvPr>
-            <p:ph type="title"/>
-          </p:nvPr>
-        </p:nvSpPr>
-        <p:spPr/>
-        <p:txBody>
-          <a:bodyPr/>
-          <a:lstStyle/>
-          <a:p>
-            <a:r>
-              <a:rPr lang="en-US" dirty="0" smtClean="0"/>
-              <a:t>Continuous </a:t>
-            </a:r>
-            <a:r>
-              <a:rPr lang="en-US" dirty="0" err="1" smtClean="0"/>
-              <a:t>INtegration</a:t>
-            </a:r>
-            <a:endParaRPr lang="en-US" dirty="0"/>
-          </a:p>
-        </p:txBody>
-      </p:sp>
-      <p:sp>
-        <p:nvSpPr>
-          <p:cNvPr id="3" name="Text Placeholder 2"/>
-          <p:cNvSpPr>
-            <a:spLocks noGrp="1"/>
-          </p:cNvSpPr>
-          <p:nvPr>
-            <p:ph type="body" idx="1"/>
-          </p:nvPr>
-        </p:nvSpPr>
-        <p:spPr/>
-        <p:txBody>
-          <a:bodyPr/>
-          <a:lstStyle/>
-          <a:p>
-            <a:endParaRPr lang="en-US"/>
-          </a:p>
-        </p:txBody>
-      </p:sp>
-    </p:spTree>
-    <p:extLst>
-      <p:ext uri="{BB962C8B-B14F-4D97-AF65-F5344CB8AC3E}">
-        <p14:creationId xmlns:p14="http://schemas.microsoft.com/office/powerpoint/2010/main" val="2532491663"/>
-      </p:ext>
-    </p:extLst>
-  </p:cSld>
-  <p:clrMapOvr>
-    <a:masterClrMapping/>
-  </p:clrMapOvr>
-</p:sld>
-</file>
-
-<file path=ppt/slides/slide61.xml><?xml version="1.0" encoding="utf-8"?>
-<p:sld xmlns:a="http://schemas.openxmlformats.org/drawingml/2006/main" xmlns:r="http://schemas.openxmlformats.org/officeDocument/2006/relationships" xmlns:p="http://schemas.openxmlformats.org/presentationml/2006/main">
-  <p:cSld>
-    <p:spTree>
-      <p:nvGrpSpPr>
-        <p:cNvPr id="1" name=""/>
-        <p:cNvGrpSpPr/>
-        <p:nvPr/>
-      </p:nvGrpSpPr>
-      <p:grpSpPr>
-        <a:xfrm>
-          <a:off x="0" y="0"/>
-          <a:ext cx="0" cy="0"/>
-          <a:chOff x="0" y="0"/>
-          <a:chExt cx="0" cy="0"/>
-        </a:xfrm>
-      </p:grpSpPr>
-      <p:sp>
-        <p:nvSpPr>
-          <p:cNvPr id="4" name="Title 3"/>
-          <p:cNvSpPr>
-            <a:spLocks noGrp="1"/>
-          </p:cNvSpPr>
-          <p:nvPr>
-            <p:ph type="title"/>
-          </p:nvPr>
-        </p:nvSpPr>
-        <p:spPr/>
-        <p:txBody>
-          <a:bodyPr/>
-          <a:lstStyle/>
-          <a:p>
-            <a:r>
-              <a:rPr lang="en-US" dirty="0" smtClean="0"/>
-              <a:t>Continuous Integration</a:t>
-            </a:r>
-            <a:endParaRPr lang="en-US" dirty="0"/>
-          </a:p>
-        </p:txBody>
-      </p:sp>
-      <p:sp>
-        <p:nvSpPr>
-          <p:cNvPr id="5" name="Content Placeholder 4"/>
-          <p:cNvSpPr>
-            <a:spLocks noGrp="1"/>
-          </p:cNvSpPr>
-          <p:nvPr>
-            <p:ph idx="1"/>
-          </p:nvPr>
-        </p:nvSpPr>
-        <p:spPr/>
-        <p:txBody>
-          <a:bodyPr/>
-          <a:lstStyle/>
-          <a:p>
-            <a:r>
-              <a:rPr lang="en-US" dirty="0" smtClean="0"/>
-              <a:t>Build server needs UWP dev tools installed</a:t>
-            </a:r>
-            <a:endParaRPr lang="en-US" dirty="0"/>
-          </a:p>
-        </p:txBody>
-      </p:sp>
-    </p:spTree>
-    <p:extLst>
-      <p:ext uri="{BB962C8B-B14F-4D97-AF65-F5344CB8AC3E}">
-        <p14:creationId xmlns:p14="http://schemas.microsoft.com/office/powerpoint/2010/main" val="3044483887"/>
-      </p:ext>
-    </p:extLst>
-  </p:cSld>
-  <p:clrMapOvr>
-    <a:masterClrMapping/>
-  </p:clrMapOvr>
-</p:sld>
-</file>
-
-<file path=ppt/slides/slide62.xml><?xml version="1.0" encoding="utf-8"?>
-<p:sld xmlns:a="http://schemas.openxmlformats.org/drawingml/2006/main" xmlns:r="http://schemas.openxmlformats.org/officeDocument/2006/relationships" xmlns:p="http://schemas.openxmlformats.org/presentationml/2006/main">
-  <p:cSld>
-    <p:spTree>
-      <p:nvGrpSpPr>
-        <p:cNvPr id="1" name=""/>
-        <p:cNvGrpSpPr/>
-        <p:nvPr/>
-      </p:nvGrpSpPr>
-      <p:grpSpPr>
-        <a:xfrm>
-          <a:off x="0" y="0"/>
-          <a:ext cx="0" cy="0"/>
-          <a:chOff x="0" y="0"/>
-          <a:chExt cx="0" cy="0"/>
-        </a:xfrm>
-      </p:grpSpPr>
-      <p:sp>
-        <p:nvSpPr>
-          <p:cNvPr id="4" name="Title 3"/>
-          <p:cNvSpPr>
-            <a:spLocks noGrp="1"/>
-          </p:cNvSpPr>
-          <p:nvPr>
-            <p:ph type="title"/>
-          </p:nvPr>
-        </p:nvSpPr>
-        <p:spPr/>
-        <p:txBody>
-          <a:bodyPr/>
-          <a:lstStyle/>
-          <a:p>
-            <a:r>
-              <a:rPr lang="en-US" dirty="0" smtClean="0"/>
-              <a:t>deployment</a:t>
-            </a:r>
-            <a:endParaRPr lang="en-US" dirty="0"/>
-          </a:p>
-        </p:txBody>
-      </p:sp>
-      <p:sp>
-        <p:nvSpPr>
-          <p:cNvPr id="5" name="Text Placeholder 4"/>
-          <p:cNvSpPr>
-            <a:spLocks noGrp="1"/>
-          </p:cNvSpPr>
-          <p:nvPr>
-            <p:ph type="body" idx="1"/>
-          </p:nvPr>
-        </p:nvSpPr>
-        <p:spPr/>
-        <p:txBody>
-          <a:bodyPr/>
-          <a:lstStyle/>
-          <a:p>
-            <a:endParaRPr lang="en-US"/>
-          </a:p>
-        </p:txBody>
-      </p:sp>
-    </p:spTree>
-    <p:extLst>
-      <p:ext uri="{BB962C8B-B14F-4D97-AF65-F5344CB8AC3E}">
-        <p14:creationId xmlns:p14="http://schemas.microsoft.com/office/powerpoint/2010/main" val="1343757648"/>
-      </p:ext>
-    </p:extLst>
-  </p:cSld>
-  <p:clrMapOvr>
-    <a:masterClrMapping/>
-  </p:clrMapOvr>
-</p:sld>
-</file>
-
-<file path=ppt/slides/slide63.xml><?xml version="1.0" encoding="utf-8"?>
-<p:sld xmlns:a="http://schemas.openxmlformats.org/drawingml/2006/main" xmlns:r="http://schemas.openxmlformats.org/officeDocument/2006/relationships" xmlns:p="http://schemas.openxmlformats.org/presentationml/2006/main">
-  <p:cSld>
-    <p:spTree>
-      <p:nvGrpSpPr>
-        <p:cNvPr id="1" name=""/>
-        <p:cNvGrpSpPr/>
-        <p:nvPr/>
-      </p:nvGrpSpPr>
-      <p:grpSpPr>
-        <a:xfrm>
-          <a:off x="0" y="0"/>
-          <a:ext cx="0" cy="0"/>
-          <a:chOff x="0" y="0"/>
-          <a:chExt cx="0" cy="0"/>
-        </a:xfrm>
-      </p:grpSpPr>
-      <p:sp>
-        <p:nvSpPr>
-          <p:cNvPr id="6" name="Title 5"/>
-          <p:cNvSpPr>
-            <a:spLocks noGrp="1"/>
-          </p:cNvSpPr>
-          <p:nvPr>
-            <p:ph type="title"/>
-          </p:nvPr>
-        </p:nvSpPr>
-        <p:spPr/>
-        <p:txBody>
-          <a:bodyPr/>
-          <a:lstStyle/>
-          <a:p>
-            <a:r>
-              <a:rPr lang="en-US" dirty="0" smtClean="0"/>
-              <a:t>Deployment</a:t>
-            </a:r>
-            <a:endParaRPr lang="en-US" dirty="0"/>
-          </a:p>
-        </p:txBody>
-      </p:sp>
-      <p:sp>
-        <p:nvSpPr>
-          <p:cNvPr id="7" name="Content Placeholder 6"/>
-          <p:cNvSpPr>
-            <a:spLocks noGrp="1"/>
-          </p:cNvSpPr>
-          <p:nvPr>
-            <p:ph idx="1"/>
-          </p:nvPr>
-        </p:nvSpPr>
-        <p:spPr/>
-        <p:txBody>
-          <a:bodyPr/>
-          <a:lstStyle/>
-          <a:p>
-            <a:r>
-              <a:rPr lang="en-US" dirty="0" smtClean="0"/>
-              <a:t>Can be done with Visual Studio</a:t>
-            </a:r>
-          </a:p>
-          <a:p>
-            <a:pPr lvl="1"/>
-            <a:r>
-              <a:rPr lang="en-US" dirty="0" smtClean="0"/>
-              <a:t>Don’t forget to add all assets for icons, etc.</a:t>
-            </a:r>
-          </a:p>
-          <a:p>
-            <a:r>
-              <a:rPr lang="en-US" dirty="0" smtClean="0"/>
-              <a:t>Create App Packages</a:t>
-            </a:r>
-          </a:p>
-          <a:p>
-            <a:pPr lvl="1"/>
-            <a:r>
-              <a:rPr lang="en-US" dirty="0" smtClean="0"/>
-              <a:t>Choose App Name</a:t>
-            </a:r>
-          </a:p>
-          <a:p>
-            <a:pPr lvl="1"/>
-            <a:r>
-              <a:rPr lang="en-US" dirty="0" smtClean="0"/>
-              <a:t>Choose Configurations</a:t>
-            </a:r>
-          </a:p>
-          <a:p>
-            <a:pPr lvl="1"/>
-            <a:r>
-              <a:rPr lang="en-US" dirty="0" smtClean="0"/>
-              <a:t>Test with local Windows App Certification Kit</a:t>
-            </a:r>
-          </a:p>
-        </p:txBody>
-      </p:sp>
-    </p:spTree>
-    <p:extLst>
-      <p:ext uri="{BB962C8B-B14F-4D97-AF65-F5344CB8AC3E}">
-        <p14:creationId xmlns:p14="http://schemas.microsoft.com/office/powerpoint/2010/main" val="3977619623"/>
-      </p:ext>
-    </p:extLst>
-  </p:cSld>
-  <p:clrMapOvr>
-    <a:masterClrMapping/>
-  </p:clrMapOvr>
 </p:sld>
 </file>
 
@@ -29601,7 +31146,11 @@
           <a:p>
             <a:r>
               <a:rPr lang="en-US" dirty="0" smtClean="0"/>
-              <a:t>Strengths</a:t>
+              <a:t>Thoughts on </a:t>
+            </a:r>
+            <a:r>
+              <a:rPr lang="en-US" dirty="0" err="1" smtClean="0"/>
+              <a:t>uwp</a:t>
             </a:r>
             <a:endParaRPr lang="en-US" dirty="0"/>
           </a:p>
@@ -29609,12 +31158,12 @@
       </p:sp>
       <p:sp>
         <p:nvSpPr>
-          <p:cNvPr id="5" name="Content Placeholder 4"/>
+          <p:cNvPr id="5" name="Text Placeholder 4"/>
           <p:cNvSpPr>
             <a:spLocks noGrp="1"/>
           </p:cNvSpPr>
           <p:nvPr>
-            <p:ph idx="1"/>
+            <p:ph type="body" idx="1"/>
           </p:nvPr>
         </p:nvSpPr>
         <p:spPr/>
@@ -29622,36 +31171,27 @@
           <a:bodyPr/>
           <a:lstStyle/>
           <a:p>
-            <a:r>
-              <a:rPr lang="en-US" dirty="0" smtClean="0"/>
-              <a:t>Working with Visual Studio and C#</a:t>
-            </a:r>
-          </a:p>
-          <a:p>
-            <a:r>
-              <a:rPr lang="en-US" dirty="0" smtClean="0"/>
-              <a:t>Testing is very easy</a:t>
-            </a:r>
-          </a:p>
-          <a:p>
-            <a:r>
-              <a:rPr lang="en-US" dirty="0" smtClean="0"/>
-              <a:t>Cover all Windows device families in one shot</a:t>
-            </a:r>
-            <a:endParaRPr lang="en-US" dirty="0"/>
+            <a:endParaRPr lang="en-US"/>
           </a:p>
         </p:txBody>
       </p:sp>
     </p:spTree>
     <p:extLst>
       <p:ext uri="{BB962C8B-B14F-4D97-AF65-F5344CB8AC3E}">
-        <p14:creationId xmlns:p14="http://schemas.microsoft.com/office/powerpoint/2010/main" val="3973510906"/>
+        <p14:creationId xmlns:p14="http://schemas.microsoft.com/office/powerpoint/2010/main" val="2974146474"/>
       </p:ext>
     </p:extLst>
   </p:cSld>
   <p:clrMapOvr>
     <a:masterClrMapping/>
   </p:clrMapOvr>
+  <p:timing>
+    <p:tnLst>
+      <p:par>
+        <p:cTn id="1" dur="indefinite" restart="never" nodeType="tmRoot"/>
+      </p:par>
+    </p:tnLst>
+  </p:timing>
 </p:sld>
 </file>
 
@@ -29674,7 +31214,7 @@
       </p:grpSpPr>
       <p:sp>
         <p:nvSpPr>
-          <p:cNvPr id="2" name="Title 1"/>
+          <p:cNvPr id="4" name="Title 3"/>
           <p:cNvSpPr>
             <a:spLocks noGrp="1"/>
           </p:cNvSpPr>
@@ -29688,15 +31228,16 @@
           <a:lstStyle/>
           <a:p>
             <a:r>
-              <a:rPr lang="en-US" dirty="0"/>
-              <a:t>Weaknesses</a:t>
-            </a:r>
+              <a:rPr lang="en-US" dirty="0" smtClean="0"/>
+              <a:t>Strengths</a:t>
+            </a:r>
+            <a:endParaRPr lang="en-US" dirty="0"/>
           </a:p>
         </p:txBody>
       </p:sp>
       <p:sp>
         <p:nvSpPr>
-          <p:cNvPr id="3" name="Content Placeholder 2"/>
+          <p:cNvPr id="5" name="Content Placeholder 4"/>
           <p:cNvSpPr>
             <a:spLocks noGrp="1"/>
           </p:cNvSpPr>
@@ -29711,10 +31252,20 @@
           <a:p>
             <a:r>
               <a:rPr lang="en-US" dirty="0" smtClean="0"/>
-              <a:t>Windows only</a:t>
-            </a:r>
-          </a:p>
-          <a:p>
+              <a:t>Working with Visual Studio and C#</a:t>
+            </a:r>
+          </a:p>
+          <a:p>
+            <a:r>
+              <a:rPr lang="en-US" dirty="0" smtClean="0"/>
+              <a:t>Testing is very easy</a:t>
+            </a:r>
+          </a:p>
+          <a:p>
+            <a:r>
+              <a:rPr lang="en-US" dirty="0" smtClean="0"/>
+              <a:t>Cover all Windows device families in one shot</a:t>
+            </a:r>
             <a:endParaRPr lang="en-US" dirty="0"/>
           </a:p>
         </p:txBody>
@@ -29722,13 +31273,229 @@
     </p:spTree>
     <p:extLst>
       <p:ext uri="{BB962C8B-B14F-4D97-AF65-F5344CB8AC3E}">
-        <p14:creationId xmlns:p14="http://schemas.microsoft.com/office/powerpoint/2010/main" val="3519852714"/>
+        <p14:creationId xmlns:p14="http://schemas.microsoft.com/office/powerpoint/2010/main" val="3973510906"/>
       </p:ext>
     </p:extLst>
   </p:cSld>
   <p:clrMapOvr>
     <a:masterClrMapping/>
   </p:clrMapOvr>
+  <p:timing>
+    <p:tnLst>
+      <p:par>
+        <p:cTn id="1" dur="indefinite" restart="never" nodeType="tmRoot">
+          <p:childTnLst>
+            <p:seq concurrent="1" nextAc="seek">
+              <p:cTn id="2" dur="indefinite" nodeType="mainSeq">
+                <p:childTnLst>
+                  <p:par>
+                    <p:cTn id="3" fill="hold">
+                      <p:stCondLst>
+                        <p:cond delay="indefinite"/>
+                      </p:stCondLst>
+                      <p:childTnLst>
+                        <p:par>
+                          <p:cTn id="4" fill="hold">
+                            <p:stCondLst>
+                              <p:cond delay="0"/>
+                            </p:stCondLst>
+                            <p:childTnLst>
+                              <p:par>
+                                <p:cTn id="5" presetID="10" presetClass="entr" presetSubtype="0" fill="hold" grpId="0" nodeType="clickEffect">
+                                  <p:stCondLst>
+                                    <p:cond delay="0"/>
+                                  </p:stCondLst>
+                                  <p:childTnLst>
+                                    <p:set>
+                                      <p:cBhvr>
+                                        <p:cTn id="6" dur="1" fill="hold">
+                                          <p:stCondLst>
+                                            <p:cond delay="0"/>
+                                          </p:stCondLst>
+                                        </p:cTn>
+                                        <p:tgtEl>
+                                          <p:spTgt spid="5">
+                                            <p:txEl>
+                                              <p:pRg st="0" end="0"/>
+                                            </p:txEl>
+                                          </p:spTgt>
+                                        </p:tgtEl>
+                                        <p:attrNameLst>
+                                          <p:attrName>style.visibility</p:attrName>
+                                        </p:attrNameLst>
+                                      </p:cBhvr>
+                                      <p:to>
+                                        <p:strVal val="visible"/>
+                                      </p:to>
+                                    </p:set>
+                                    <p:animEffect transition="in" filter="fade">
+                                      <p:cBhvr>
+                                        <p:cTn id="7" dur="500"/>
+                                        <p:tgtEl>
+                                          <p:spTgt spid="5">
+                                            <p:txEl>
+                                              <p:pRg st="0" end="0"/>
+                                            </p:txEl>
+                                          </p:spTgt>
+                                        </p:tgtEl>
+                                      </p:cBhvr>
+                                    </p:animEffect>
+                                  </p:childTnLst>
+                                </p:cTn>
+                              </p:par>
+                            </p:childTnLst>
+                          </p:cTn>
+                        </p:par>
+                      </p:childTnLst>
+                    </p:cTn>
+                  </p:par>
+                  <p:par>
+                    <p:cTn id="8" fill="hold">
+                      <p:stCondLst>
+                        <p:cond delay="indefinite"/>
+                      </p:stCondLst>
+                      <p:childTnLst>
+                        <p:par>
+                          <p:cTn id="9" fill="hold">
+                            <p:stCondLst>
+                              <p:cond delay="0"/>
+                            </p:stCondLst>
+                            <p:childTnLst>
+                              <p:par>
+                                <p:cTn id="10" presetID="10" presetClass="entr" presetSubtype="0" fill="hold" grpId="0" nodeType="clickEffect">
+                                  <p:stCondLst>
+                                    <p:cond delay="0"/>
+                                  </p:stCondLst>
+                                  <p:childTnLst>
+                                    <p:set>
+                                      <p:cBhvr>
+                                        <p:cTn id="11" dur="1" fill="hold">
+                                          <p:stCondLst>
+                                            <p:cond delay="0"/>
+                                          </p:stCondLst>
+                                        </p:cTn>
+                                        <p:tgtEl>
+                                          <p:spTgt spid="5">
+                                            <p:txEl>
+                                              <p:pRg st="1" end="1"/>
+                                            </p:txEl>
+                                          </p:spTgt>
+                                        </p:tgtEl>
+                                        <p:attrNameLst>
+                                          <p:attrName>style.visibility</p:attrName>
+                                        </p:attrNameLst>
+                                      </p:cBhvr>
+                                      <p:to>
+                                        <p:strVal val="visible"/>
+                                      </p:to>
+                                    </p:set>
+                                    <p:animEffect transition="in" filter="fade">
+                                      <p:cBhvr>
+                                        <p:cTn id="12" dur="500"/>
+                                        <p:tgtEl>
+                                          <p:spTgt spid="5">
+                                            <p:txEl>
+                                              <p:pRg st="1" end="1"/>
+                                            </p:txEl>
+                                          </p:spTgt>
+                                        </p:tgtEl>
+                                      </p:cBhvr>
+                                    </p:animEffect>
+                                  </p:childTnLst>
+                                </p:cTn>
+                              </p:par>
+                            </p:childTnLst>
+                          </p:cTn>
+                        </p:par>
+                      </p:childTnLst>
+                    </p:cTn>
+                  </p:par>
+                  <p:par>
+                    <p:cTn id="13" fill="hold">
+                      <p:stCondLst>
+                        <p:cond delay="indefinite"/>
+                      </p:stCondLst>
+                      <p:childTnLst>
+                        <p:par>
+                          <p:cTn id="14" fill="hold">
+                            <p:stCondLst>
+                              <p:cond delay="0"/>
+                            </p:stCondLst>
+                            <p:childTnLst>
+                              <p:par>
+                                <p:cTn id="15" presetID="10" presetClass="entr" presetSubtype="0" fill="hold" grpId="0" nodeType="clickEffect">
+                                  <p:stCondLst>
+                                    <p:cond delay="0"/>
+                                  </p:stCondLst>
+                                  <p:childTnLst>
+                                    <p:set>
+                                      <p:cBhvr>
+                                        <p:cTn id="16" dur="1" fill="hold">
+                                          <p:stCondLst>
+                                            <p:cond delay="0"/>
+                                          </p:stCondLst>
+                                        </p:cTn>
+                                        <p:tgtEl>
+                                          <p:spTgt spid="5">
+                                            <p:txEl>
+                                              <p:pRg st="2" end="2"/>
+                                            </p:txEl>
+                                          </p:spTgt>
+                                        </p:tgtEl>
+                                        <p:attrNameLst>
+                                          <p:attrName>style.visibility</p:attrName>
+                                        </p:attrNameLst>
+                                      </p:cBhvr>
+                                      <p:to>
+                                        <p:strVal val="visible"/>
+                                      </p:to>
+                                    </p:set>
+                                    <p:animEffect transition="in" filter="fade">
+                                      <p:cBhvr>
+                                        <p:cTn id="17" dur="500"/>
+                                        <p:tgtEl>
+                                          <p:spTgt spid="5">
+                                            <p:txEl>
+                                              <p:pRg st="2" end="2"/>
+                                            </p:txEl>
+                                          </p:spTgt>
+                                        </p:tgtEl>
+                                      </p:cBhvr>
+                                    </p:animEffect>
+                                  </p:childTnLst>
+                                </p:cTn>
+                              </p:par>
+                            </p:childTnLst>
+                          </p:cTn>
+                        </p:par>
+                      </p:childTnLst>
+                    </p:cTn>
+                  </p:par>
+                </p:childTnLst>
+              </p:cTn>
+              <p:prevCondLst>
+                <p:cond evt="onPrev" delay="0">
+                  <p:tgtEl>
+                    <p:sldTgt/>
+                  </p:tgtEl>
+                </p:cond>
+              </p:prevCondLst>
+              <p:nextCondLst>
+                <p:cond evt="onNext" delay="0">
+                  <p:tgtEl>
+                    <p:sldTgt/>
+                  </p:tgtEl>
+                </p:cond>
+              </p:nextCondLst>
+            </p:seq>
+          </p:childTnLst>
+        </p:cTn>
+      </p:par>
+    </p:tnLst>
+    <p:bldLst>
+      <p:bldP spid="5" grpId="0" uiExpand="1" build="p"/>
+    </p:bldLst>
+  </p:timing>
 </p:sld>
 </file>
 
@@ -29765,10 +31532,9 @@
           <a:lstStyle/>
           <a:p>
             <a:r>
-              <a:rPr lang="en-US" dirty="0" smtClean="0"/>
-              <a:t>Conclusion</a:t>
-            </a:r>
-            <a:endParaRPr lang="en-US" dirty="0"/>
+              <a:rPr lang="en-US" dirty="0"/>
+              <a:t>Weaknesses</a:t>
+            </a:r>
           </a:p>
         </p:txBody>
       </p:sp>
@@ -29789,15 +31555,179 @@
           <a:p>
             <a:r>
               <a:rPr lang="en-US" dirty="0" smtClean="0"/>
-              <a:t>Best choice if building </a:t>
-            </a:r>
+              <a:t>Windows only</a:t>
+            </a:r>
+          </a:p>
+          <a:p>
+            <a:endParaRPr lang="en-US" dirty="0"/>
+          </a:p>
+        </p:txBody>
+      </p:sp>
+    </p:spTree>
+    <p:extLst>
+      <p:ext uri="{BB962C8B-B14F-4D97-AF65-F5344CB8AC3E}">
+        <p14:creationId xmlns:p14="http://schemas.microsoft.com/office/powerpoint/2010/main" val="3519852714"/>
+      </p:ext>
+    </p:extLst>
+  </p:cSld>
+  <p:clrMapOvr>
+    <a:masterClrMapping/>
+  </p:clrMapOvr>
+  <p:timing>
+    <p:tnLst>
+      <p:par>
+        <p:cTn id="1" dur="indefinite" restart="never" nodeType="tmRoot">
+          <p:childTnLst>
+            <p:seq concurrent="1" nextAc="seek">
+              <p:cTn id="2" dur="indefinite" nodeType="mainSeq">
+                <p:childTnLst>
+                  <p:par>
+                    <p:cTn id="3" fill="hold">
+                      <p:stCondLst>
+                        <p:cond delay="indefinite"/>
+                      </p:stCondLst>
+                      <p:childTnLst>
+                        <p:par>
+                          <p:cTn id="4" fill="hold">
+                            <p:stCondLst>
+                              <p:cond delay="0"/>
+                            </p:stCondLst>
+                            <p:childTnLst>
+                              <p:par>
+                                <p:cTn id="5" presetID="10" presetClass="entr" presetSubtype="0" fill="hold" grpId="0" nodeType="clickEffect">
+                                  <p:stCondLst>
+                                    <p:cond delay="0"/>
+                                  </p:stCondLst>
+                                  <p:childTnLst>
+                                    <p:set>
+                                      <p:cBhvr>
+                                        <p:cTn id="6" dur="1" fill="hold">
+                                          <p:stCondLst>
+                                            <p:cond delay="0"/>
+                                          </p:stCondLst>
+                                        </p:cTn>
+                                        <p:tgtEl>
+                                          <p:spTgt spid="3">
+                                            <p:txEl>
+                                              <p:pRg st="0" end="0"/>
+                                            </p:txEl>
+                                          </p:spTgt>
+                                        </p:tgtEl>
+                                        <p:attrNameLst>
+                                          <p:attrName>style.visibility</p:attrName>
+                                        </p:attrNameLst>
+                                      </p:cBhvr>
+                                      <p:to>
+                                        <p:strVal val="visible"/>
+                                      </p:to>
+                                    </p:set>
+                                    <p:animEffect transition="in" filter="fade">
+                                      <p:cBhvr>
+                                        <p:cTn id="7" dur="500"/>
+                                        <p:tgtEl>
+                                          <p:spTgt spid="3">
+                                            <p:txEl>
+                                              <p:pRg st="0" end="0"/>
+                                            </p:txEl>
+                                          </p:spTgt>
+                                        </p:tgtEl>
+                                      </p:cBhvr>
+                                    </p:animEffect>
+                                  </p:childTnLst>
+                                </p:cTn>
+                              </p:par>
+                            </p:childTnLst>
+                          </p:cTn>
+                        </p:par>
+                      </p:childTnLst>
+                    </p:cTn>
+                  </p:par>
+                </p:childTnLst>
+              </p:cTn>
+              <p:prevCondLst>
+                <p:cond evt="onPrev" delay="0">
+                  <p:tgtEl>
+                    <p:sldTgt/>
+                  </p:tgtEl>
+                </p:cond>
+              </p:prevCondLst>
+              <p:nextCondLst>
+                <p:cond evt="onNext" delay="0">
+                  <p:tgtEl>
+                    <p:sldTgt/>
+                  </p:tgtEl>
+                </p:cond>
+              </p:nextCondLst>
+            </p:seq>
+          </p:childTnLst>
+        </p:cTn>
+      </p:par>
+    </p:tnLst>
+    <p:bldLst>
+      <p:bldP spid="3" grpId="0" build="p"/>
+    </p:bldLst>
+  </p:timing>
+</p:sld>
+</file>
+
+<file path=ppt/slides/slide67.xml><?xml version="1.0" encoding="utf-8"?>
+<p:sld xmlns:a="http://schemas.openxmlformats.org/drawingml/2006/main" xmlns:r="http://schemas.openxmlformats.org/officeDocument/2006/relationships" xmlns:p="http://schemas.openxmlformats.org/presentationml/2006/main">
+  <p:cSld>
+    <p:spTree>
+      <p:nvGrpSpPr>
+        <p:cNvPr id="1" name=""/>
+        <p:cNvGrpSpPr/>
+        <p:nvPr/>
+      </p:nvGrpSpPr>
+      <p:grpSpPr>
+        <a:xfrm>
+          <a:off x="0" y="0"/>
+          <a:ext cx="0" cy="0"/>
+          <a:chOff x="0" y="0"/>
+          <a:chExt cx="0" cy="0"/>
+        </a:xfrm>
+      </p:grpSpPr>
+      <p:sp>
+        <p:nvSpPr>
+          <p:cNvPr id="2" name="Title 1"/>
+          <p:cNvSpPr>
+            <a:spLocks noGrp="1"/>
+          </p:cNvSpPr>
+          <p:nvPr>
+            <p:ph type="title"/>
+          </p:nvPr>
+        </p:nvSpPr>
+        <p:spPr/>
+        <p:txBody>
+          <a:bodyPr/>
+          <a:lstStyle/>
+          <a:p>
             <a:r>
               <a:rPr lang="en-US" dirty="0" smtClean="0"/>
-              <a:t>for Windows </a:t>
-            </a:r>
+              <a:t>Conclusion</a:t>
+            </a:r>
+            <a:endParaRPr lang="en-US" dirty="0"/>
+          </a:p>
+        </p:txBody>
+      </p:sp>
+      <p:sp>
+        <p:nvSpPr>
+          <p:cNvPr id="3" name="Content Placeholder 2"/>
+          <p:cNvSpPr>
+            <a:spLocks noGrp="1"/>
+          </p:cNvSpPr>
+          <p:nvPr>
+            <p:ph idx="1"/>
+          </p:nvPr>
+        </p:nvSpPr>
+        <p:spPr/>
+        <p:txBody>
+          <a:bodyPr/>
+          <a:lstStyle/>
+          <a:p>
             <a:r>
               <a:rPr lang="en-US" dirty="0" smtClean="0"/>
-              <a:t>only</a:t>
+              <a:t>Best choice if building for Windows only</a:t>
             </a:r>
           </a:p>
           <a:p>
@@ -29811,11 +31741,7 @@
             <a:pPr lvl="1"/>
             <a:r>
               <a:rPr lang="en-US" dirty="0" smtClean="0"/>
-              <a:t>Makes the experience </a:t>
-            </a:r>
-            <a:r>
-              <a:rPr lang="en-US" smtClean="0"/>
-              <a:t>very smooth</a:t>
+              <a:t>Makes the experience very smooth</a:t>
             </a:r>
           </a:p>
         </p:txBody>
@@ -29830,10 +31756,217 @@
   <p:clrMapOvr>
     <a:masterClrMapping/>
   </p:clrMapOvr>
+  <p:timing>
+    <p:tnLst>
+      <p:par>
+        <p:cTn id="1" dur="indefinite" restart="never" nodeType="tmRoot">
+          <p:childTnLst>
+            <p:seq concurrent="1" nextAc="seek">
+              <p:cTn id="2" dur="indefinite" nodeType="mainSeq">
+                <p:childTnLst>
+                  <p:par>
+                    <p:cTn id="3" fill="hold">
+                      <p:stCondLst>
+                        <p:cond delay="indefinite"/>
+                      </p:stCondLst>
+                      <p:childTnLst>
+                        <p:par>
+                          <p:cTn id="4" fill="hold">
+                            <p:stCondLst>
+                              <p:cond delay="0"/>
+                            </p:stCondLst>
+                            <p:childTnLst>
+                              <p:par>
+                                <p:cTn id="5" presetID="10" presetClass="entr" presetSubtype="0" fill="hold" grpId="0" nodeType="clickEffect">
+                                  <p:stCondLst>
+                                    <p:cond delay="0"/>
+                                  </p:stCondLst>
+                                  <p:childTnLst>
+                                    <p:set>
+                                      <p:cBhvr>
+                                        <p:cTn id="6" dur="1" fill="hold">
+                                          <p:stCondLst>
+                                            <p:cond delay="0"/>
+                                          </p:stCondLst>
+                                        </p:cTn>
+                                        <p:tgtEl>
+                                          <p:spTgt spid="3">
+                                            <p:txEl>
+                                              <p:pRg st="0" end="0"/>
+                                            </p:txEl>
+                                          </p:spTgt>
+                                        </p:tgtEl>
+                                        <p:attrNameLst>
+                                          <p:attrName>style.visibility</p:attrName>
+                                        </p:attrNameLst>
+                                      </p:cBhvr>
+                                      <p:to>
+                                        <p:strVal val="visible"/>
+                                      </p:to>
+                                    </p:set>
+                                    <p:animEffect transition="in" filter="fade">
+                                      <p:cBhvr>
+                                        <p:cTn id="7" dur="500"/>
+                                        <p:tgtEl>
+                                          <p:spTgt spid="3">
+                                            <p:txEl>
+                                              <p:pRg st="0" end="0"/>
+                                            </p:txEl>
+                                          </p:spTgt>
+                                        </p:tgtEl>
+                                      </p:cBhvr>
+                                    </p:animEffect>
+                                  </p:childTnLst>
+                                </p:cTn>
+                              </p:par>
+                            </p:childTnLst>
+                          </p:cTn>
+                        </p:par>
+                      </p:childTnLst>
+                    </p:cTn>
+                  </p:par>
+                  <p:par>
+                    <p:cTn id="8" fill="hold">
+                      <p:stCondLst>
+                        <p:cond delay="indefinite"/>
+                      </p:stCondLst>
+                      <p:childTnLst>
+                        <p:par>
+                          <p:cTn id="9" fill="hold">
+                            <p:stCondLst>
+                              <p:cond delay="0"/>
+                            </p:stCondLst>
+                            <p:childTnLst>
+                              <p:par>
+                                <p:cTn id="10" presetID="10" presetClass="entr" presetSubtype="0" fill="hold" grpId="0" nodeType="clickEffect">
+                                  <p:stCondLst>
+                                    <p:cond delay="0"/>
+                                  </p:stCondLst>
+                                  <p:childTnLst>
+                                    <p:set>
+                                      <p:cBhvr>
+                                        <p:cTn id="11" dur="1" fill="hold">
+                                          <p:stCondLst>
+                                            <p:cond delay="0"/>
+                                          </p:stCondLst>
+                                        </p:cTn>
+                                        <p:tgtEl>
+                                          <p:spTgt spid="3">
+                                            <p:txEl>
+                                              <p:pRg st="1" end="1"/>
+                                            </p:txEl>
+                                          </p:spTgt>
+                                        </p:tgtEl>
+                                        <p:attrNameLst>
+                                          <p:attrName>style.visibility</p:attrName>
+                                        </p:attrNameLst>
+                                      </p:cBhvr>
+                                      <p:to>
+                                        <p:strVal val="visible"/>
+                                      </p:to>
+                                    </p:set>
+                                    <p:animEffect transition="in" filter="fade">
+                                      <p:cBhvr>
+                                        <p:cTn id="12" dur="500"/>
+                                        <p:tgtEl>
+                                          <p:spTgt spid="3">
+                                            <p:txEl>
+                                              <p:pRg st="1" end="1"/>
+                                            </p:txEl>
+                                          </p:spTgt>
+                                        </p:tgtEl>
+                                      </p:cBhvr>
+                                    </p:animEffect>
+                                  </p:childTnLst>
+                                </p:cTn>
+                              </p:par>
+                            </p:childTnLst>
+                          </p:cTn>
+                        </p:par>
+                        <p:par>
+                          <p:cTn id="13" fill="hold">
+                            <p:stCondLst>
+                              <p:cond delay="500"/>
+                            </p:stCondLst>
+                            <p:childTnLst>
+                              <p:par>
+                                <p:cTn id="14" presetID="10" presetClass="entr" presetSubtype="0" fill="hold" grpId="0" nodeType="afterEffect">
+                                  <p:stCondLst>
+                                    <p:cond delay="0"/>
+                                  </p:stCondLst>
+                                  <p:childTnLst>
+                                    <p:set>
+                                      <p:cBhvr>
+                                        <p:cTn id="15" dur="1" fill="hold">
+                                          <p:stCondLst>
+                                            <p:cond delay="0"/>
+                                          </p:stCondLst>
+                                        </p:cTn>
+                                        <p:tgtEl>
+                                          <p:spTgt spid="3">
+                                            <p:txEl>
+                                              <p:pRg st="2" end="2"/>
+                                            </p:txEl>
+                                          </p:spTgt>
+                                        </p:tgtEl>
+                                        <p:attrNameLst>
+                                          <p:attrName>style.visibility</p:attrName>
+                                        </p:attrNameLst>
+                                      </p:cBhvr>
+                                      <p:to>
+                                        <p:strVal val="visible"/>
+                                      </p:to>
+                                    </p:set>
+                                    <p:animEffect transition="in" filter="fade">
+                                      <p:cBhvr>
+                                        <p:cTn id="16" dur="500"/>
+                                        <p:tgtEl>
+                                          <p:spTgt spid="3">
+                                            <p:txEl>
+                                              <p:pRg st="2" end="2"/>
+                                            </p:txEl>
+                                          </p:spTgt>
+                                        </p:tgtEl>
+                                      </p:cBhvr>
+                                    </p:animEffect>
+                                  </p:childTnLst>
+                                </p:cTn>
+                              </p:par>
+                            </p:childTnLst>
+                          </p:cTn>
+                        </p:par>
+                      </p:childTnLst>
+                    </p:cTn>
+                  </p:par>
+                </p:childTnLst>
+              </p:cTn>
+              <p:prevCondLst>
+                <p:cond evt="onPrev" delay="0">
+                  <p:tgtEl>
+                    <p:sldTgt/>
+                  </p:tgtEl>
+                </p:cond>
+              </p:prevCondLst>
+              <p:nextCondLst>
+                <p:cond evt="onNext" delay="0">
+                  <p:tgtEl>
+                    <p:sldTgt/>
+                  </p:tgtEl>
+                </p:cond>
+              </p:nextCondLst>
+            </p:seq>
+          </p:childTnLst>
+        </p:cTn>
+      </p:par>
+    </p:tnLst>
+    <p:bldLst>
+      <p:bldP spid="3" grpId="0" uiExpand="1" build="p"/>
+    </p:bldLst>
+  </p:timing>
 </p:sld>
 </file>
 
-<file path=ppt/slides/slide67.xml><?xml version="1.0" encoding="utf-8"?>
+<file path=ppt/slides/slide68.xml><?xml version="1.0" encoding="utf-8"?>
 <p:sld xmlns:a="http://schemas.openxmlformats.org/drawingml/2006/main" xmlns:r="http://schemas.openxmlformats.org/officeDocument/2006/relationships" xmlns:p="http://schemas.openxmlformats.org/presentationml/2006/main">
   <p:cSld>
     <p:spTree>
@@ -30256,15 +32389,24 @@
                                   </p:childTnLst>
                                 </p:cTn>
                               </p:par>
+                            </p:childTnLst>
+                          </p:cTn>
+                        </p:par>
+                        <p:par>
+                          <p:cTn id="21" fill="hold">
+                            <p:stCondLst>
+                              <p:cond delay="1500"/>
+                            </p:stCondLst>
+                            <p:childTnLst>
                               <p:par>
-                                <p:cTn id="21" presetID="10" presetClass="entr" presetSubtype="0" fill="hold" grpId="0" nodeType="withEffect">
+                                <p:cTn id="22" presetID="10" presetClass="entr" presetSubtype="0" fill="hold" grpId="0" nodeType="afterEffect">
                                   <p:stCondLst>
                                     <p:cond delay="0"/>
                                   </p:stCondLst>
                                   <p:childTnLst>
                                     <p:set>
                                       <p:cBhvr>
-                                        <p:cTn id="22" dur="1" fill="hold">
+                                        <p:cTn id="23" dur="1" fill="hold">
                                           <p:stCondLst>
                                             <p:cond delay="0"/>
                                           </p:stCondLst>
@@ -30286,7 +32428,7 @@
                                     </p:set>
                                     <p:animEffect transition="in" filter="fade">
                                       <p:cBhvr>
-                                        <p:cTn id="23" dur="500"/>
+                                        <p:cTn id="24" dur="500"/>
                                         <p:tgtEl>
                                           <p:spTgt spid="3">
                                             <p:txEl>
@@ -30327,7 +32469,7 @@
       </p:par>
     </p:tnLst>
     <p:bldLst>
-      <p:bldP spid="3" grpId="0" build="p"/>
+      <p:bldP spid="3" grpId="0" uiExpand="1" build="p"/>
     </p:bldLst>
   </p:timing>
 </p:sld>
@@ -30881,6 +33023,317 @@
   <p:clrMapOvr>
     <a:masterClrMapping/>
   </p:clrMapOvr>
+  <p:timing>
+    <p:tnLst>
+      <p:par>
+        <p:cTn id="1" dur="indefinite" restart="never" nodeType="tmRoot">
+          <p:childTnLst>
+            <p:seq concurrent="1" nextAc="seek">
+              <p:cTn id="2" dur="indefinite" nodeType="mainSeq">
+                <p:childTnLst>
+                  <p:par>
+                    <p:cTn id="3" fill="hold">
+                      <p:stCondLst>
+                        <p:cond delay="indefinite"/>
+                      </p:stCondLst>
+                      <p:childTnLst>
+                        <p:par>
+                          <p:cTn id="4" fill="hold">
+                            <p:stCondLst>
+                              <p:cond delay="0"/>
+                            </p:stCondLst>
+                            <p:childTnLst>
+                              <p:par>
+                                <p:cTn id="5" presetID="10" presetClass="entr" presetSubtype="0" fill="hold" grpId="0" nodeType="clickEffect">
+                                  <p:stCondLst>
+                                    <p:cond delay="0"/>
+                                  </p:stCondLst>
+                                  <p:childTnLst>
+                                    <p:set>
+                                      <p:cBhvr>
+                                        <p:cTn id="6" dur="1" fill="hold">
+                                          <p:stCondLst>
+                                            <p:cond delay="0"/>
+                                          </p:stCondLst>
+                                        </p:cTn>
+                                        <p:tgtEl>
+                                          <p:spTgt spid="3">
+                                            <p:txEl>
+                                              <p:pRg st="0" end="0"/>
+                                            </p:txEl>
+                                          </p:spTgt>
+                                        </p:tgtEl>
+                                        <p:attrNameLst>
+                                          <p:attrName>style.visibility</p:attrName>
+                                        </p:attrNameLst>
+                                      </p:cBhvr>
+                                      <p:to>
+                                        <p:strVal val="visible"/>
+                                      </p:to>
+                                    </p:set>
+                                    <p:animEffect transition="in" filter="fade">
+                                      <p:cBhvr>
+                                        <p:cTn id="7" dur="500"/>
+                                        <p:tgtEl>
+                                          <p:spTgt spid="3">
+                                            <p:txEl>
+                                              <p:pRg st="0" end="0"/>
+                                            </p:txEl>
+                                          </p:spTgt>
+                                        </p:tgtEl>
+                                      </p:cBhvr>
+                                    </p:animEffect>
+                                  </p:childTnLst>
+                                </p:cTn>
+                              </p:par>
+                            </p:childTnLst>
+                          </p:cTn>
+                        </p:par>
+                        <p:par>
+                          <p:cTn id="8" fill="hold">
+                            <p:stCondLst>
+                              <p:cond delay="500"/>
+                            </p:stCondLst>
+                            <p:childTnLst>
+                              <p:par>
+                                <p:cTn id="9" presetID="10" presetClass="entr" presetSubtype="0" fill="hold" grpId="0" nodeType="afterEffect">
+                                  <p:stCondLst>
+                                    <p:cond delay="0"/>
+                                  </p:stCondLst>
+                                  <p:childTnLst>
+                                    <p:set>
+                                      <p:cBhvr>
+                                        <p:cTn id="10" dur="1" fill="hold">
+                                          <p:stCondLst>
+                                            <p:cond delay="0"/>
+                                          </p:stCondLst>
+                                        </p:cTn>
+                                        <p:tgtEl>
+                                          <p:spTgt spid="3">
+                                            <p:txEl>
+                                              <p:pRg st="1" end="1"/>
+                                            </p:txEl>
+                                          </p:spTgt>
+                                        </p:tgtEl>
+                                        <p:attrNameLst>
+                                          <p:attrName>style.visibility</p:attrName>
+                                        </p:attrNameLst>
+                                      </p:cBhvr>
+                                      <p:to>
+                                        <p:strVal val="visible"/>
+                                      </p:to>
+                                    </p:set>
+                                    <p:animEffect transition="in" filter="fade">
+                                      <p:cBhvr>
+                                        <p:cTn id="11" dur="500"/>
+                                        <p:tgtEl>
+                                          <p:spTgt spid="3">
+                                            <p:txEl>
+                                              <p:pRg st="1" end="1"/>
+                                            </p:txEl>
+                                          </p:spTgt>
+                                        </p:tgtEl>
+                                      </p:cBhvr>
+                                    </p:animEffect>
+                                  </p:childTnLst>
+                                </p:cTn>
+                              </p:par>
+                            </p:childTnLst>
+                          </p:cTn>
+                        </p:par>
+                      </p:childTnLst>
+                    </p:cTn>
+                  </p:par>
+                  <p:par>
+                    <p:cTn id="12" fill="hold">
+                      <p:stCondLst>
+                        <p:cond delay="indefinite"/>
+                      </p:stCondLst>
+                      <p:childTnLst>
+                        <p:par>
+                          <p:cTn id="13" fill="hold">
+                            <p:stCondLst>
+                              <p:cond delay="0"/>
+                            </p:stCondLst>
+                            <p:childTnLst>
+                              <p:par>
+                                <p:cTn id="14" presetID="10" presetClass="entr" presetSubtype="0" fill="hold" grpId="0" nodeType="clickEffect">
+                                  <p:stCondLst>
+                                    <p:cond delay="0"/>
+                                  </p:stCondLst>
+                                  <p:childTnLst>
+                                    <p:set>
+                                      <p:cBhvr>
+                                        <p:cTn id="15" dur="1" fill="hold">
+                                          <p:stCondLst>
+                                            <p:cond delay="0"/>
+                                          </p:stCondLst>
+                                        </p:cTn>
+                                        <p:tgtEl>
+                                          <p:spTgt spid="3">
+                                            <p:txEl>
+                                              <p:pRg st="2" end="2"/>
+                                            </p:txEl>
+                                          </p:spTgt>
+                                        </p:tgtEl>
+                                        <p:attrNameLst>
+                                          <p:attrName>style.visibility</p:attrName>
+                                        </p:attrNameLst>
+                                      </p:cBhvr>
+                                      <p:to>
+                                        <p:strVal val="visible"/>
+                                      </p:to>
+                                    </p:set>
+                                    <p:animEffect transition="in" filter="fade">
+                                      <p:cBhvr>
+                                        <p:cTn id="16" dur="500"/>
+                                        <p:tgtEl>
+                                          <p:spTgt spid="3">
+                                            <p:txEl>
+                                              <p:pRg st="2" end="2"/>
+                                            </p:txEl>
+                                          </p:spTgt>
+                                        </p:tgtEl>
+                                      </p:cBhvr>
+                                    </p:animEffect>
+                                  </p:childTnLst>
+                                </p:cTn>
+                              </p:par>
+                            </p:childTnLst>
+                          </p:cTn>
+                        </p:par>
+                        <p:par>
+                          <p:cTn id="17" fill="hold">
+                            <p:stCondLst>
+                              <p:cond delay="500"/>
+                            </p:stCondLst>
+                            <p:childTnLst>
+                              <p:par>
+                                <p:cTn id="18" presetID="10" presetClass="entr" presetSubtype="0" fill="hold" grpId="0" nodeType="afterEffect">
+                                  <p:stCondLst>
+                                    <p:cond delay="0"/>
+                                  </p:stCondLst>
+                                  <p:childTnLst>
+                                    <p:set>
+                                      <p:cBhvr>
+                                        <p:cTn id="19" dur="1" fill="hold">
+                                          <p:stCondLst>
+                                            <p:cond delay="0"/>
+                                          </p:stCondLst>
+                                        </p:cTn>
+                                        <p:tgtEl>
+                                          <p:spTgt spid="3">
+                                            <p:txEl>
+                                              <p:pRg st="3" end="3"/>
+                                            </p:txEl>
+                                          </p:spTgt>
+                                        </p:tgtEl>
+                                        <p:attrNameLst>
+                                          <p:attrName>style.visibility</p:attrName>
+                                        </p:attrNameLst>
+                                      </p:cBhvr>
+                                      <p:to>
+                                        <p:strVal val="visible"/>
+                                      </p:to>
+                                    </p:set>
+                                    <p:animEffect transition="in" filter="fade">
+                                      <p:cBhvr>
+                                        <p:cTn id="20" dur="500"/>
+                                        <p:tgtEl>
+                                          <p:spTgt spid="3">
+                                            <p:txEl>
+                                              <p:pRg st="3" end="3"/>
+                                            </p:txEl>
+                                          </p:spTgt>
+                                        </p:tgtEl>
+                                      </p:cBhvr>
+                                    </p:animEffect>
+                                  </p:childTnLst>
+                                </p:cTn>
+                              </p:par>
+                            </p:childTnLst>
+                          </p:cTn>
+                        </p:par>
+                        <p:par>
+                          <p:cTn id="21" fill="hold">
+                            <p:stCondLst>
+                              <p:cond delay="1000"/>
+                            </p:stCondLst>
+                            <p:childTnLst>
+                              <p:par>
+                                <p:cTn id="22" presetID="10" presetClass="entr" presetSubtype="0" fill="hold" grpId="0" nodeType="afterEffect">
+                                  <p:stCondLst>
+                                    <p:cond delay="0"/>
+                                  </p:stCondLst>
+                                  <p:childTnLst>
+                                    <p:set>
+                                      <p:cBhvr>
+                                        <p:cTn id="23" dur="1" fill="hold">
+                                          <p:stCondLst>
+                                            <p:cond delay="0"/>
+                                          </p:stCondLst>
+                                        </p:cTn>
+                                        <p:tgtEl>
+                                          <p:spTgt spid="3">
+                                            <p:txEl>
+                                              <p:pRg st="4" end="4"/>
+                                            </p:txEl>
+                                          </p:spTgt>
+                                        </p:tgtEl>
+                                        <p:attrNameLst>
+                                          <p:attrName>style.visibility</p:attrName>
+                                        </p:attrNameLst>
+                                      </p:cBhvr>
+                                      <p:to>
+                                        <p:strVal val="visible"/>
+                                      </p:to>
+                                    </p:set>
+                                    <p:animEffect transition="in" filter="fade">
+                                      <p:cBhvr>
+                                        <p:cTn id="24" dur="500"/>
+                                        <p:tgtEl>
+                                          <p:spTgt spid="3">
+                                            <p:txEl>
+                                              <p:pRg st="4" end="4"/>
+                                            </p:txEl>
+                                          </p:spTgt>
+                                        </p:tgtEl>
+                                      </p:cBhvr>
+                                    </p:animEffect>
+                                  </p:childTnLst>
+                                </p:cTn>
+                              </p:par>
+                            </p:childTnLst>
+                          </p:cTn>
+                        </p:par>
+                      </p:childTnLst>
+                    </p:cTn>
+                  </p:par>
+                </p:childTnLst>
+              </p:cTn>
+              <p:prevCondLst>
+                <p:cond evt="onPrev" delay="0">
+                  <p:tgtEl>
+                    <p:sldTgt/>
+                  </p:tgtEl>
+                </p:cond>
+              </p:prevCondLst>
+              <p:nextCondLst>
+                <p:cond evt="onNext" delay="0">
+                  <p:tgtEl>
+                    <p:sldTgt/>
+                  </p:tgtEl>
+                </p:cond>
+              </p:nextCondLst>
+            </p:seq>
+          </p:childTnLst>
+        </p:cTn>
+      </p:par>
+    </p:tnLst>
+    <p:bldLst>
+      <p:bldP spid="3" grpId="0" uiExpand="1" build="p"/>
+    </p:bldLst>
+  </p:timing>
 </p:sld>
 </file>
 

</xml_diff>